<commit_message>
updated ep1000 sensors with IR and 37 kit
</commit_message>
<xml_diff>
--- a/presentations/ep1000_sensors/ep1000_sensors.pptx
+++ b/presentations/ep1000_sensors/ep1000_sensors.pptx
@@ -5,7 +5,7 @@
     <p:sldMasterId id="2147483660" r:id="rId1"/>
   </p:sldMasterIdLst>
   <p:notesMasterIdLst>
-    <p:notesMasterId r:id="rId18"/>
+    <p:notesMasterId r:id="rId22"/>
   </p:notesMasterIdLst>
   <p:sldIdLst>
     <p:sldId id="256" r:id="rId2"/>
@@ -13,17 +13,21 @@
     <p:sldId id="261" r:id="rId4"/>
     <p:sldId id="262" r:id="rId5"/>
     <p:sldId id="263" r:id="rId6"/>
-    <p:sldId id="264" r:id="rId7"/>
-    <p:sldId id="265" r:id="rId8"/>
-    <p:sldId id="270" r:id="rId9"/>
-    <p:sldId id="266" r:id="rId10"/>
-    <p:sldId id="267" r:id="rId11"/>
-    <p:sldId id="268" r:id="rId12"/>
-    <p:sldId id="269" r:id="rId13"/>
-    <p:sldId id="271" r:id="rId14"/>
-    <p:sldId id="272" r:id="rId15"/>
-    <p:sldId id="273" r:id="rId16"/>
-    <p:sldId id="259" r:id="rId17"/>
+    <p:sldId id="274" r:id="rId7"/>
+    <p:sldId id="275" r:id="rId8"/>
+    <p:sldId id="276" r:id="rId9"/>
+    <p:sldId id="264" r:id="rId10"/>
+    <p:sldId id="265" r:id="rId11"/>
+    <p:sldId id="270" r:id="rId12"/>
+    <p:sldId id="266" r:id="rId13"/>
+    <p:sldId id="267" r:id="rId14"/>
+    <p:sldId id="268" r:id="rId15"/>
+    <p:sldId id="269" r:id="rId16"/>
+    <p:sldId id="271" r:id="rId17"/>
+    <p:sldId id="272" r:id="rId18"/>
+    <p:sldId id="277" r:id="rId19"/>
+    <p:sldId id="273" r:id="rId20"/>
+    <p:sldId id="259" r:id="rId21"/>
   </p:sldIdLst>
   <p:sldSz cx="9144000" cy="6858000" type="screen4x3"/>
   <p:notesSz cx="6858000" cy="9144000"/>
@@ -212,7 +216,7 @@
           <a:p>
             <a:fld id="{2A875741-58CA-43A4-9946-B635E52C5CD8}" type="datetimeFigureOut">
               <a:rPr lang="en-US" smtClean="0"/>
-              <a:t>6/8/2021</a:t>
+              <a:t>6/10/2021</a:t>
             </a:fld>
             <a:endParaRPr lang="en-US"/>
           </a:p>
@@ -622,7 +626,7 @@
           <a:p>
             <a:fld id="{9665C769-D7C3-4E51-9622-EB882B1C6B88}" type="datetime1">
               <a:rPr lang="en-US" smtClean="0"/>
-              <a:t>6/8/2021</a:t>
+              <a:t>6/10/2021</a:t>
             </a:fld>
             <a:endParaRPr lang="en-US"/>
           </a:p>
@@ -816,7 +820,7 @@
           <a:p>
             <a:fld id="{AC2FA8F2-92AD-4DF3-BB80-1A576E4607C5}" type="datetime1">
               <a:rPr lang="en-US" smtClean="0"/>
-              <a:t>6/8/2021</a:t>
+              <a:t>6/10/2021</a:t>
             </a:fld>
             <a:endParaRPr lang="en-US"/>
           </a:p>
@@ -1015,7 +1019,7 @@
           <a:p>
             <a:fld id="{FF161318-0D48-4B52-BC2D-A0EA8E79725D}" type="datetime1">
               <a:rPr lang="en-US" smtClean="0"/>
-              <a:t>6/8/2021</a:t>
+              <a:t>6/10/2021</a:t>
             </a:fld>
             <a:endParaRPr lang="en-US"/>
           </a:p>
@@ -1209,7 +1213,7 @@
           <a:p>
             <a:fld id="{828929F4-2E32-48E9-8E95-ABAA8EAAF6A9}" type="datetime1">
               <a:rPr lang="en-US" smtClean="0"/>
-              <a:t>6/8/2021</a:t>
+              <a:t>6/10/2021</a:t>
             </a:fld>
             <a:endParaRPr lang="en-US"/>
           </a:p>
@@ -1472,7 +1476,7 @@
           <a:p>
             <a:fld id="{4D668969-C21F-428C-9E53-8D921FF4543A}" type="datetime1">
               <a:rPr lang="en-US" smtClean="0"/>
-              <a:t>6/8/2021</a:t>
+              <a:t>6/10/2021</a:t>
             </a:fld>
             <a:endParaRPr lang="en-US"/>
           </a:p>
@@ -1726,7 +1730,7 @@
           <a:p>
             <a:fld id="{01FB22A5-6159-4D69-BFEE-F4892803599C}" type="datetime1">
               <a:rPr lang="en-US" smtClean="0"/>
-              <a:t>6/8/2021</a:t>
+              <a:t>6/10/2021</a:t>
             </a:fld>
             <a:endParaRPr lang="en-US"/>
           </a:p>
@@ -2120,7 +2124,7 @@
           <a:p>
             <a:fld id="{738CC944-9765-440C-9A18-3DC1DA37440E}" type="datetime1">
               <a:rPr lang="en-US" smtClean="0"/>
-              <a:t>6/8/2021</a:t>
+              <a:t>6/10/2021</a:t>
             </a:fld>
             <a:endParaRPr lang="en-US"/>
           </a:p>
@@ -2254,7 +2258,7 @@
           <a:p>
             <a:fld id="{D8661C67-BB8E-4D16-A78D-460AAF94A53C}" type="datetime1">
               <a:rPr lang="en-US" smtClean="0"/>
-              <a:t>6/8/2021</a:t>
+              <a:t>6/10/2021</a:t>
             </a:fld>
             <a:endParaRPr lang="en-US"/>
           </a:p>
@@ -2365,7 +2369,7 @@
           <a:p>
             <a:fld id="{DBBC12E8-4105-456C-A90A-AF2362FB188F}" type="datetime1">
               <a:rPr lang="en-US" smtClean="0"/>
-              <a:t>6/8/2021</a:t>
+              <a:t>6/10/2021</a:t>
             </a:fld>
             <a:endParaRPr lang="en-US"/>
           </a:p>
@@ -2664,7 +2668,7 @@
           <a:p>
             <a:fld id="{11FD4DDA-56B2-4B92-884C-68E9C78E3003}" type="datetime1">
               <a:rPr lang="en-US" smtClean="0"/>
-              <a:t>6/8/2021</a:t>
+              <a:t>6/10/2021</a:t>
             </a:fld>
             <a:endParaRPr lang="en-US"/>
           </a:p>
@@ -2943,7 +2947,7 @@
           <a:p>
             <a:fld id="{750461B4-47C4-4F2C-98A2-225FD39D225C}" type="datetime1">
               <a:rPr lang="en-US" smtClean="0"/>
-              <a:t>6/8/2021</a:t>
+              <a:t>6/10/2021</a:t>
             </a:fld>
             <a:endParaRPr lang="en-US"/>
           </a:p>
@@ -3608,6 +3612,645 @@
           <p:cNvPr id="2" name="Title 1">
             <a:extLst>
               <a:ext uri="{FF2B5EF4-FFF2-40B4-BE49-F238E27FC236}">
+                <a16:creationId xmlns:a16="http://schemas.microsoft.com/office/drawing/2014/main" id="{C4B331DF-994E-4D7F-B17A-14AB1A9DFAB7}"/>
+              </a:ext>
+            </a:extLst>
+          </p:cNvPr>
+          <p:cNvSpPr>
+            <a:spLocks noGrp="1"/>
+          </p:cNvSpPr>
+          <p:nvPr>
+            <p:ph type="title"/>
+          </p:nvPr>
+        </p:nvSpPr>
+        <p:spPr/>
+        <p:txBody>
+          <a:bodyPr/>
+          <a:lstStyle/>
+          <a:p>
+            <a:r>
+              <a:rPr lang="en-SG" dirty="0"/>
+              <a:t>Measuring Distance – SR04</a:t>
+            </a:r>
+            <a:endParaRPr lang="en-US" dirty="0"/>
+          </a:p>
+        </p:txBody>
+      </p:sp>
+      <p:sp>
+        <p:nvSpPr>
+          <p:cNvPr id="5" name="Slide Number Placeholder 4">
+            <a:extLst>
+              <a:ext uri="{FF2B5EF4-FFF2-40B4-BE49-F238E27FC236}">
+                <a16:creationId xmlns:a16="http://schemas.microsoft.com/office/drawing/2014/main" id="{490BA051-1950-4D92-A9FE-F7CBD8B97C88}"/>
+              </a:ext>
+            </a:extLst>
+          </p:cNvPr>
+          <p:cNvSpPr>
+            <a:spLocks noGrp="1"/>
+          </p:cNvSpPr>
+          <p:nvPr>
+            <p:ph type="sldNum" sz="quarter" idx="12"/>
+          </p:nvPr>
+        </p:nvSpPr>
+        <p:spPr/>
+        <p:txBody>
+          <a:bodyPr/>
+          <a:lstStyle/>
+          <a:p>
+            <a:fld id="{CAB166B3-F268-4CEF-878A-CFB0D0D505D3}" type="slidenum">
+              <a:rPr lang="en-US" smtClean="0"/>
+              <a:t>10</a:t>
+            </a:fld>
+            <a:endParaRPr lang="en-US"/>
+          </a:p>
+        </p:txBody>
+      </p:sp>
+      <p:pic>
+        <p:nvPicPr>
+          <p:cNvPr id="12" name="Content Placeholder 11">
+            <a:extLst>
+              <a:ext uri="{FF2B5EF4-FFF2-40B4-BE49-F238E27FC236}">
+                <a16:creationId xmlns:a16="http://schemas.microsoft.com/office/drawing/2014/main" id="{0B0DA044-DCA1-4AC0-9E6E-34F2C03C526B}"/>
+              </a:ext>
+            </a:extLst>
+          </p:cNvPr>
+          <p:cNvPicPr>
+            <a:picLocks noGrp="1" noChangeAspect="1"/>
+          </p:cNvPicPr>
+          <p:nvPr>
+            <p:ph sz="half" idx="1"/>
+          </p:nvPr>
+        </p:nvPicPr>
+        <p:blipFill>
+          <a:blip r:embed="rId2"/>
+          <a:stretch>
+            <a:fillRect/>
+          </a:stretch>
+        </p:blipFill>
+        <p:spPr>
+          <a:xfrm>
+            <a:off x="628650" y="1562197"/>
+            <a:ext cx="7034022" cy="3500223"/>
+          </a:xfrm>
+        </p:spPr>
+      </p:pic>
+      <p:sp>
+        <p:nvSpPr>
+          <p:cNvPr id="9" name="Content Placeholder 8">
+            <a:extLst>
+              <a:ext uri="{FF2B5EF4-FFF2-40B4-BE49-F238E27FC236}">
+                <a16:creationId xmlns:a16="http://schemas.microsoft.com/office/drawing/2014/main" id="{67304A7D-DFB3-4C19-9972-36A8880F7F8E}"/>
+              </a:ext>
+            </a:extLst>
+          </p:cNvPr>
+          <p:cNvSpPr>
+            <a:spLocks noGrp="1"/>
+          </p:cNvSpPr>
+          <p:nvPr>
+            <p:ph sz="half" idx="2"/>
+          </p:nvPr>
+        </p:nvSpPr>
+        <p:spPr>
+          <a:xfrm>
+            <a:off x="628650" y="5162527"/>
+            <a:ext cx="7886700" cy="1193824"/>
+          </a:xfrm>
+        </p:spPr>
+        <p:txBody>
+          <a:bodyPr/>
+          <a:lstStyle/>
+          <a:p>
+            <a:r>
+              <a:rPr lang="en-SG" sz="1800" dirty="0"/>
+              <a:t>LOW pulse (10 mS) is used to trigger the sensor</a:t>
+            </a:r>
+          </a:p>
+          <a:p>
+            <a:r>
+              <a:rPr lang="en-SG" sz="1800" dirty="0"/>
+              <a:t>Return pulse is measured using </a:t>
+            </a:r>
+            <a:r>
+              <a:rPr lang="en-SG" sz="1800" dirty="0" err="1"/>
+              <a:t>pulseIn</a:t>
+            </a:r>
+            <a:r>
+              <a:rPr lang="en-SG" sz="1800" dirty="0"/>
+              <a:t>(), distance is proportional to pulse length</a:t>
+            </a:r>
+            <a:endParaRPr lang="en-US" sz="1800" dirty="0"/>
+          </a:p>
+        </p:txBody>
+      </p:sp>
+    </p:spTree>
+    <p:extLst>
+      <p:ext uri="{BB962C8B-B14F-4D97-AF65-F5344CB8AC3E}">
+        <p14:creationId xmlns:p14="http://schemas.microsoft.com/office/powerpoint/2010/main" val="3807239228"/>
+      </p:ext>
+    </p:extLst>
+  </p:cSld>
+  <p:clrMapOvr>
+    <a:masterClrMapping/>
+  </p:clrMapOvr>
+</p:sld>
+</file>
+
+<file path=ppt/slides/slide11.xml><?xml version="1.0" encoding="utf-8"?>
+<p:sld xmlns:a="http://schemas.openxmlformats.org/drawingml/2006/main" xmlns:r="http://schemas.openxmlformats.org/officeDocument/2006/relationships" xmlns:p="http://schemas.openxmlformats.org/presentationml/2006/main">
+  <p:cSld>
+    <p:spTree>
+      <p:nvGrpSpPr>
+        <p:cNvPr id="1" name=""/>
+        <p:cNvGrpSpPr/>
+        <p:nvPr/>
+      </p:nvGrpSpPr>
+      <p:grpSpPr>
+        <a:xfrm>
+          <a:off x="0" y="0"/>
+          <a:ext cx="0" cy="0"/>
+          <a:chOff x="0" y="0"/>
+          <a:chExt cx="0" cy="0"/>
+        </a:xfrm>
+      </p:grpSpPr>
+      <p:sp>
+        <p:nvSpPr>
+          <p:cNvPr id="2" name="Title 1">
+            <a:extLst>
+              <a:ext uri="{FF2B5EF4-FFF2-40B4-BE49-F238E27FC236}">
+                <a16:creationId xmlns:a16="http://schemas.microsoft.com/office/drawing/2014/main" id="{C69891C6-6E16-4AEE-87B8-57E6952D3C86}"/>
+              </a:ext>
+            </a:extLst>
+          </p:cNvPr>
+          <p:cNvSpPr>
+            <a:spLocks noGrp="1"/>
+          </p:cNvSpPr>
+          <p:nvPr>
+            <p:ph type="title"/>
+          </p:nvPr>
+        </p:nvSpPr>
+        <p:spPr/>
+        <p:txBody>
+          <a:bodyPr/>
+          <a:lstStyle/>
+          <a:p>
+            <a:r>
+              <a:rPr lang="en-SG" dirty="0"/>
+              <a:t>PIR Motion Sensor HC-SR501</a:t>
+            </a:r>
+            <a:endParaRPr lang="en-US" dirty="0"/>
+          </a:p>
+        </p:txBody>
+      </p:sp>
+      <p:sp>
+        <p:nvSpPr>
+          <p:cNvPr id="3" name="Content Placeholder 2">
+            <a:extLst>
+              <a:ext uri="{FF2B5EF4-FFF2-40B4-BE49-F238E27FC236}">
+                <a16:creationId xmlns:a16="http://schemas.microsoft.com/office/drawing/2014/main" id="{C98B88DC-3363-43A2-9635-845612A6B76C}"/>
+              </a:ext>
+            </a:extLst>
+          </p:cNvPr>
+          <p:cNvSpPr>
+            <a:spLocks noGrp="1"/>
+          </p:cNvSpPr>
+          <p:nvPr>
+            <p:ph sz="half" idx="1"/>
+          </p:nvPr>
+        </p:nvSpPr>
+        <p:spPr>
+          <a:xfrm>
+            <a:off x="628650" y="1627319"/>
+            <a:ext cx="3886200" cy="4351338"/>
+          </a:xfrm>
+        </p:spPr>
+        <p:txBody>
+          <a:bodyPr/>
+          <a:lstStyle/>
+          <a:p>
+            <a:r>
+              <a:rPr lang="en-SG" sz="2400" dirty="0">
+                <a:hlinkClick r:id="rId2"/>
+              </a:rPr>
+              <a:t>Passive Infra Red</a:t>
+            </a:r>
+            <a:r>
+              <a:rPr lang="en-SG" sz="2400" dirty="0"/>
+              <a:t> </a:t>
+            </a:r>
+          </a:p>
+          <a:p>
+            <a:r>
+              <a:rPr lang="en-SG" sz="2400" dirty="0"/>
+              <a:t>Detects motion</a:t>
+            </a:r>
+          </a:p>
+          <a:p>
+            <a:pPr lvl="1"/>
+            <a:r>
+              <a:rPr lang="en-SG" sz="2000" dirty="0"/>
+              <a:t>Adjust Sensitivity</a:t>
+            </a:r>
+          </a:p>
+          <a:p>
+            <a:pPr lvl="1"/>
+            <a:r>
+              <a:rPr lang="en-SG" sz="2000" dirty="0"/>
+              <a:t>Wait at least 15 s</a:t>
+            </a:r>
+          </a:p>
+          <a:p>
+            <a:r>
+              <a:rPr lang="en-SG" sz="2400" dirty="0"/>
+              <a:t>No Library required, 1 digital I/O input pin for status.</a:t>
+            </a:r>
+          </a:p>
+          <a:p>
+            <a:r>
+              <a:rPr lang="en-SG" sz="2400" dirty="0"/>
+              <a:t>Check pin</a:t>
+            </a:r>
+          </a:p>
+          <a:p>
+            <a:pPr lvl="1"/>
+            <a:r>
+              <a:rPr lang="en-SG" sz="2000" dirty="0"/>
+              <a:t>LOW no motion</a:t>
+            </a:r>
+          </a:p>
+          <a:p>
+            <a:pPr lvl="1"/>
+            <a:r>
+              <a:rPr lang="en-SG" sz="2000" dirty="0"/>
+              <a:t>HIGH motion detected</a:t>
+            </a:r>
+          </a:p>
+          <a:p>
+            <a:r>
+              <a:rPr lang="en-SG" sz="2400" dirty="0"/>
+              <a:t>Cannot measure distance</a:t>
+            </a:r>
+          </a:p>
+        </p:txBody>
+      </p:sp>
+      <p:sp>
+        <p:nvSpPr>
+          <p:cNvPr id="5" name="Slide Number Placeholder 4">
+            <a:extLst>
+              <a:ext uri="{FF2B5EF4-FFF2-40B4-BE49-F238E27FC236}">
+                <a16:creationId xmlns:a16="http://schemas.microsoft.com/office/drawing/2014/main" id="{56552937-2EC0-419A-9BF9-A8676C32A95C}"/>
+              </a:ext>
+            </a:extLst>
+          </p:cNvPr>
+          <p:cNvSpPr>
+            <a:spLocks noGrp="1"/>
+          </p:cNvSpPr>
+          <p:nvPr>
+            <p:ph type="sldNum" sz="quarter" idx="12"/>
+          </p:nvPr>
+        </p:nvSpPr>
+        <p:spPr/>
+        <p:txBody>
+          <a:bodyPr/>
+          <a:lstStyle/>
+          <a:p>
+            <a:fld id="{CAB166B3-F268-4CEF-878A-CFB0D0D505D3}" type="slidenum">
+              <a:rPr lang="en-US" smtClean="0"/>
+              <a:t>11</a:t>
+            </a:fld>
+            <a:endParaRPr lang="en-US"/>
+          </a:p>
+        </p:txBody>
+      </p:sp>
+      <p:pic>
+        <p:nvPicPr>
+          <p:cNvPr id="11" name="Content Placeholder 10">
+            <a:hlinkClick r:id="rId3"/>
+            <a:extLst>
+              <a:ext uri="{FF2B5EF4-FFF2-40B4-BE49-F238E27FC236}">
+                <a16:creationId xmlns:a16="http://schemas.microsoft.com/office/drawing/2014/main" id="{B6AC0092-B88F-4B2F-B88B-C29D5E2017E9}"/>
+              </a:ext>
+            </a:extLst>
+          </p:cNvPr>
+          <p:cNvPicPr>
+            <a:picLocks noGrp="1" noChangeAspect="1"/>
+          </p:cNvPicPr>
+          <p:nvPr>
+            <p:ph sz="half" idx="2"/>
+          </p:nvPr>
+        </p:nvPicPr>
+        <p:blipFill>
+          <a:blip r:embed="rId4"/>
+          <a:stretch>
+            <a:fillRect/>
+          </a:stretch>
+        </p:blipFill>
+        <p:spPr>
+          <a:xfrm>
+            <a:off x="4629150" y="1531546"/>
+            <a:ext cx="3886200" cy="3709554"/>
+          </a:xfrm>
+        </p:spPr>
+      </p:pic>
+      <p:sp>
+        <p:nvSpPr>
+          <p:cNvPr id="12" name="TextBox 11">
+            <a:extLst>
+              <a:ext uri="{FF2B5EF4-FFF2-40B4-BE49-F238E27FC236}">
+                <a16:creationId xmlns:a16="http://schemas.microsoft.com/office/drawing/2014/main" id="{C4C92BCE-E609-46A5-8E7B-D8F6E2B44E4D}"/>
+              </a:ext>
+            </a:extLst>
+          </p:cNvPr>
+          <p:cNvSpPr txBox="1"/>
+          <p:nvPr/>
+        </p:nvSpPr>
+        <p:spPr>
+          <a:xfrm>
+            <a:off x="4629150" y="5475383"/>
+            <a:ext cx="3886200" cy="830997"/>
+          </a:xfrm>
+          <a:prstGeom prst="rect">
+            <a:avLst/>
+          </a:prstGeom>
+          <a:noFill/>
+        </p:spPr>
+        <p:txBody>
+          <a:bodyPr wrap="square" rtlCol="0">
+            <a:spAutoFit/>
+          </a:bodyPr>
+          <a:lstStyle/>
+          <a:p>
+            <a:pPr algn="l"/>
+            <a:r>
+              <a:rPr lang="en-SG" sz="1600" dirty="0">
+                <a:hlinkClick r:id="rId3"/>
+              </a:rPr>
+              <a:t>Motion detection using PIR HC-SR501</a:t>
+            </a:r>
+            <a:endParaRPr lang="en-SG" sz="1600" dirty="0"/>
+          </a:p>
+          <a:p>
+            <a:pPr algn="l"/>
+            <a:r>
+              <a:rPr lang="en-SG" sz="1600" dirty="0"/>
+              <a:t>Better alternative: </a:t>
+            </a:r>
+            <a:r>
+              <a:rPr lang="en-SG" sz="1600" dirty="0">
+                <a:hlinkClick r:id="rId5"/>
+              </a:rPr>
+              <a:t>RCWL-0516 Microwave Proximity Sensor</a:t>
+            </a:r>
+            <a:endParaRPr lang="en-US" sz="1600" dirty="0"/>
+          </a:p>
+        </p:txBody>
+      </p:sp>
+    </p:spTree>
+    <p:extLst>
+      <p:ext uri="{BB962C8B-B14F-4D97-AF65-F5344CB8AC3E}">
+        <p14:creationId xmlns:p14="http://schemas.microsoft.com/office/powerpoint/2010/main" val="74894023"/>
+      </p:ext>
+    </p:extLst>
+  </p:cSld>
+  <p:clrMapOvr>
+    <a:masterClrMapping/>
+  </p:clrMapOvr>
+</p:sld>
+</file>
+
+<file path=ppt/slides/slide12.xml><?xml version="1.0" encoding="utf-8"?>
+<p:sld xmlns:a="http://schemas.openxmlformats.org/drawingml/2006/main" xmlns:r="http://schemas.openxmlformats.org/officeDocument/2006/relationships" xmlns:p="http://schemas.openxmlformats.org/presentationml/2006/main">
+  <p:cSld>
+    <p:spTree>
+      <p:nvGrpSpPr>
+        <p:cNvPr id="1" name=""/>
+        <p:cNvGrpSpPr/>
+        <p:nvPr/>
+      </p:nvGrpSpPr>
+      <p:grpSpPr>
+        <a:xfrm>
+          <a:off x="0" y="0"/>
+          <a:ext cx="0" cy="0"/>
+          <a:chOff x="0" y="0"/>
+          <a:chExt cx="0" cy="0"/>
+        </a:xfrm>
+      </p:grpSpPr>
+      <p:sp>
+        <p:nvSpPr>
+          <p:cNvPr id="2" name="Title 1">
+            <a:extLst>
+              <a:ext uri="{FF2B5EF4-FFF2-40B4-BE49-F238E27FC236}">
+                <a16:creationId xmlns:a16="http://schemas.microsoft.com/office/drawing/2014/main" id="{B8824EAC-CB23-4361-BF44-7DA2B4E3005D}"/>
+              </a:ext>
+            </a:extLst>
+          </p:cNvPr>
+          <p:cNvSpPr>
+            <a:spLocks noGrp="1"/>
+          </p:cNvSpPr>
+          <p:nvPr>
+            <p:ph type="title"/>
+          </p:nvPr>
+        </p:nvSpPr>
+        <p:spPr/>
+        <p:txBody>
+          <a:bodyPr/>
+          <a:lstStyle/>
+          <a:p>
+            <a:r>
+              <a:rPr lang="en-SG" dirty="0"/>
+              <a:t>Room Temperature &amp; Humidity</a:t>
+            </a:r>
+            <a:endParaRPr lang="en-US" dirty="0"/>
+          </a:p>
+        </p:txBody>
+      </p:sp>
+      <p:sp>
+        <p:nvSpPr>
+          <p:cNvPr id="3" name="Content Placeholder 2">
+            <a:extLst>
+              <a:ext uri="{FF2B5EF4-FFF2-40B4-BE49-F238E27FC236}">
+                <a16:creationId xmlns:a16="http://schemas.microsoft.com/office/drawing/2014/main" id="{31FAD7EA-FF5B-4DD0-826F-E70003B9618A}"/>
+              </a:ext>
+            </a:extLst>
+          </p:cNvPr>
+          <p:cNvSpPr>
+            <a:spLocks noGrp="1"/>
+          </p:cNvSpPr>
+          <p:nvPr>
+            <p:ph sz="half" idx="1"/>
+          </p:nvPr>
+        </p:nvSpPr>
+        <p:spPr/>
+        <p:txBody>
+          <a:bodyPr/>
+          <a:lstStyle/>
+          <a:p>
+            <a:r>
+              <a:rPr lang="en-SG" sz="1800" dirty="0">
+                <a:hlinkClick r:id="rId2"/>
+              </a:rPr>
+              <a:t>DHT-11</a:t>
+            </a:r>
+            <a:r>
+              <a:rPr lang="en-SG" sz="1800" dirty="0"/>
+              <a:t> Temperature and Humidity sensor</a:t>
+            </a:r>
+          </a:p>
+          <a:p>
+            <a:r>
+              <a:rPr lang="en-SG" sz="1800" dirty="0"/>
+              <a:t>20~80% humidity, 0~50</a:t>
+            </a:r>
+            <a:r>
+              <a:rPr lang="en-SG" sz="1800" baseline="30000" dirty="0"/>
+              <a:t>o</a:t>
+            </a:r>
+            <a:r>
+              <a:rPr lang="en-SG" sz="1800" dirty="0"/>
+              <a:t>C</a:t>
+            </a:r>
+            <a:br>
+              <a:rPr lang="en-SG" sz="1800" dirty="0"/>
+            </a:br>
+            <a:r>
+              <a:rPr lang="en-SG" sz="1800" dirty="0"/>
+              <a:t>1 Hz sampling rate.</a:t>
+            </a:r>
+          </a:p>
+          <a:p>
+            <a:r>
+              <a:rPr lang="en-SG" sz="1800" dirty="0">
+                <a:hlinkClick r:id="rId3"/>
+              </a:rPr>
+              <a:t>Library from Adafruit </a:t>
+            </a:r>
+            <a:r>
+              <a:rPr lang="en-SG" sz="1800" dirty="0"/>
+              <a:t>(install both):</a:t>
+            </a:r>
+          </a:p>
+          <a:p>
+            <a:pPr lvl="1"/>
+            <a:r>
+              <a:rPr lang="en-SG" sz="1600" dirty="0" err="1"/>
+              <a:t>TinyDHT</a:t>
+            </a:r>
+            <a:endParaRPr lang="en-SG" sz="1600" dirty="0"/>
+          </a:p>
+          <a:p>
+            <a:pPr lvl="1"/>
+            <a:r>
+              <a:rPr lang="en-SG" sz="1600" dirty="0" err="1"/>
+              <a:t>TinyWire</a:t>
+            </a:r>
+            <a:endParaRPr lang="en-SG" sz="1600" dirty="0"/>
+          </a:p>
+          <a:p>
+            <a:r>
+              <a:rPr lang="en-US" sz="2000" dirty="0"/>
+              <a:t>Requires 1 digital I/O pin</a:t>
+            </a:r>
+          </a:p>
+          <a:p>
+            <a:r>
+              <a:rPr lang="en-US" sz="2000" dirty="0"/>
+              <a:t>Better results, accuracy with the DHT-22, however, 2~3x more expensive</a:t>
+            </a:r>
+          </a:p>
+        </p:txBody>
+      </p:sp>
+      <p:pic>
+        <p:nvPicPr>
+          <p:cNvPr id="9" name="Content Placeholder 8">
+            <a:extLst>
+              <a:ext uri="{FF2B5EF4-FFF2-40B4-BE49-F238E27FC236}">
+                <a16:creationId xmlns:a16="http://schemas.microsoft.com/office/drawing/2014/main" id="{BCF0C9D3-90AC-4E12-A2D2-322FF77E7009}"/>
+              </a:ext>
+            </a:extLst>
+          </p:cNvPr>
+          <p:cNvPicPr>
+            <a:picLocks noGrp="1" noChangeAspect="1"/>
+          </p:cNvPicPr>
+          <p:nvPr>
+            <p:ph sz="half" idx="2"/>
+          </p:nvPr>
+        </p:nvPicPr>
+        <p:blipFill>
+          <a:blip r:embed="rId4"/>
+          <a:stretch>
+            <a:fillRect/>
+          </a:stretch>
+        </p:blipFill>
+        <p:spPr>
+          <a:xfrm>
+            <a:off x="4629150" y="1853407"/>
+            <a:ext cx="3886200" cy="1991486"/>
+          </a:xfrm>
+        </p:spPr>
+      </p:pic>
+      <p:sp>
+        <p:nvSpPr>
+          <p:cNvPr id="5" name="Slide Number Placeholder 4">
+            <a:extLst>
+              <a:ext uri="{FF2B5EF4-FFF2-40B4-BE49-F238E27FC236}">
+                <a16:creationId xmlns:a16="http://schemas.microsoft.com/office/drawing/2014/main" id="{DF59765E-8A4D-44A7-8F3B-A9FE57AA7728}"/>
+              </a:ext>
+            </a:extLst>
+          </p:cNvPr>
+          <p:cNvSpPr>
+            <a:spLocks noGrp="1"/>
+          </p:cNvSpPr>
+          <p:nvPr>
+            <p:ph type="sldNum" sz="quarter" idx="12"/>
+          </p:nvPr>
+        </p:nvSpPr>
+        <p:spPr/>
+        <p:txBody>
+          <a:bodyPr/>
+          <a:lstStyle/>
+          <a:p>
+            <a:fld id="{CAB166B3-F268-4CEF-878A-CFB0D0D505D3}" type="slidenum">
+              <a:rPr lang="en-US" smtClean="0"/>
+              <a:t>12</a:t>
+            </a:fld>
+            <a:endParaRPr lang="en-US"/>
+          </a:p>
+        </p:txBody>
+      </p:sp>
+    </p:spTree>
+    <p:extLst>
+      <p:ext uri="{BB962C8B-B14F-4D97-AF65-F5344CB8AC3E}">
+        <p14:creationId xmlns:p14="http://schemas.microsoft.com/office/powerpoint/2010/main" val="3146419609"/>
+      </p:ext>
+    </p:extLst>
+  </p:cSld>
+  <p:clrMapOvr>
+    <a:masterClrMapping/>
+  </p:clrMapOvr>
+</p:sld>
+</file>
+
+<file path=ppt/slides/slide13.xml><?xml version="1.0" encoding="utf-8"?>
+<p:sld xmlns:a="http://schemas.openxmlformats.org/drawingml/2006/main" xmlns:r="http://schemas.openxmlformats.org/officeDocument/2006/relationships" xmlns:p="http://schemas.openxmlformats.org/presentationml/2006/main">
+  <p:cSld>
+    <p:spTree>
+      <p:nvGrpSpPr>
+        <p:cNvPr id="1" name=""/>
+        <p:cNvGrpSpPr/>
+        <p:nvPr/>
+      </p:nvGrpSpPr>
+      <p:grpSpPr>
+        <a:xfrm>
+          <a:off x="0" y="0"/>
+          <a:ext cx="0" cy="0"/>
+          <a:chOff x="0" y="0"/>
+          <a:chExt cx="0" cy="0"/>
+        </a:xfrm>
+      </p:grpSpPr>
+      <p:sp>
+        <p:nvSpPr>
+          <p:cNvPr id="2" name="Title 1">
+            <a:extLst>
+              <a:ext uri="{FF2B5EF4-FFF2-40B4-BE49-F238E27FC236}">
                 <a16:creationId xmlns:a16="http://schemas.microsoft.com/office/drawing/2014/main" id="{C2C29DDD-4CA0-46EF-A5E1-119D7841DB0E}"/>
               </a:ext>
             </a:extLst>
@@ -3806,7 +4449,7 @@
           <a:p>
             <a:fld id="{CAB166B3-F268-4CEF-878A-CFB0D0D505D3}" type="slidenum">
               <a:rPr lang="en-US" smtClean="0"/>
-              <a:t>10</a:t>
+              <a:t>13</a:t>
             </a:fld>
             <a:endParaRPr lang="en-US"/>
           </a:p>
@@ -3855,7 +4498,7 @@
 </p:sld>
 </file>
 
-<file path=ppt/slides/slide11.xml><?xml version="1.0" encoding="utf-8"?>
+<file path=ppt/slides/slide14.xml><?xml version="1.0" encoding="utf-8"?>
 <p:sld xmlns:a="http://schemas.openxmlformats.org/drawingml/2006/main" xmlns:r="http://schemas.openxmlformats.org/officeDocument/2006/relationships" xmlns:p="http://schemas.openxmlformats.org/presentationml/2006/main">
   <p:cSld>
     <p:spTree>
@@ -4069,7 +4712,7 @@
           <a:p>
             <a:fld id="{CAB166B3-F268-4CEF-878A-CFB0D0D505D3}" type="slidenum">
               <a:rPr lang="en-US" smtClean="0"/>
-              <a:t>11</a:t>
+              <a:t>14</a:t>
             </a:fld>
             <a:endParaRPr lang="en-US"/>
           </a:p>
@@ -4088,7 +4731,7 @@
 </p:sld>
 </file>
 
-<file path=ppt/slides/slide12.xml><?xml version="1.0" encoding="utf-8"?>
+<file path=ppt/slides/slide15.xml><?xml version="1.0" encoding="utf-8"?>
 <p:sld xmlns:a="http://schemas.openxmlformats.org/drawingml/2006/main" xmlns:r="http://schemas.openxmlformats.org/officeDocument/2006/relationships" xmlns:p="http://schemas.openxmlformats.org/presentationml/2006/main">
   <p:cSld>
     <p:spTree>
@@ -4159,7 +4802,7 @@
           <a:p>
             <a:fld id="{CAB166B3-F268-4CEF-878A-CFB0D0D505D3}" type="slidenum">
               <a:rPr lang="en-US" smtClean="0"/>
-              <a:t>12</a:t>
+              <a:t>15</a:t>
             </a:fld>
             <a:endParaRPr lang="en-US"/>
           </a:p>
@@ -7826,7 +8469,7 @@
 </p:sld>
 </file>
 
-<file path=ppt/slides/slide13.xml><?xml version="1.0" encoding="utf-8"?>
+<file path=ppt/slides/slide16.xml><?xml version="1.0" encoding="utf-8"?>
 <p:sld xmlns:a="http://schemas.openxmlformats.org/drawingml/2006/main" xmlns:r="http://schemas.openxmlformats.org/officeDocument/2006/relationships" xmlns:p="http://schemas.openxmlformats.org/presentationml/2006/main">
   <p:cSld>
     <p:spTree>
@@ -8010,7 +8653,7 @@
           <a:p>
             <a:fld id="{CAB166B3-F268-4CEF-878A-CFB0D0D505D3}" type="slidenum">
               <a:rPr lang="en-US" smtClean="0"/>
-              <a:t>13</a:t>
+              <a:t>16</a:t>
             </a:fld>
             <a:endParaRPr lang="en-US"/>
           </a:p>
@@ -8029,7 +8672,7 @@
 </p:sld>
 </file>
 
-<file path=ppt/slides/slide14.xml><?xml version="1.0" encoding="utf-8"?>
+<file path=ppt/slides/slide17.xml><?xml version="1.0" encoding="utf-8"?>
 <p:sld xmlns:a="http://schemas.openxmlformats.org/drawingml/2006/main" xmlns:r="http://schemas.openxmlformats.org/officeDocument/2006/relationships" xmlns:p="http://schemas.openxmlformats.org/presentationml/2006/main">
   <p:cSld>
     <p:spTree>
@@ -8242,7 +8885,7 @@
           <a:p>
             <a:fld id="{CAB166B3-F268-4CEF-878A-CFB0D0D505D3}" type="slidenum">
               <a:rPr lang="en-US" smtClean="0"/>
-              <a:t>14</a:t>
+              <a:t>17</a:t>
             </a:fld>
             <a:endParaRPr lang="en-US"/>
           </a:p>
@@ -8385,7 +9028,7 @@
 </p:sld>
 </file>
 
-<file path=ppt/slides/slide15.xml><?xml version="1.0" encoding="utf-8"?>
+<file path=ppt/slides/slide18.xml><?xml version="1.0" encoding="utf-8"?>
 <p:sld xmlns:a="http://schemas.openxmlformats.org/drawingml/2006/main" xmlns:r="http://schemas.openxmlformats.org/officeDocument/2006/relationships" xmlns:p="http://schemas.openxmlformats.org/presentationml/2006/main">
   <p:cSld>
     <p:spTree>
@@ -8407,7 +9050,7 @@
           <p:cNvPr id="2" name="Title 1">
             <a:extLst>
               <a:ext uri="{FF2B5EF4-FFF2-40B4-BE49-F238E27FC236}">
-                <a16:creationId xmlns:a16="http://schemas.microsoft.com/office/drawing/2014/main" id="{10D1060D-741A-499F-B6B6-DDFCEB7FC034}"/>
+                <a16:creationId xmlns:a16="http://schemas.microsoft.com/office/drawing/2014/main" id="{460B0DC0-CDF2-4E22-95DF-D7C6FE21EA89}"/>
               </a:ext>
             </a:extLst>
           </p:cNvPr>
@@ -8425,18 +9068,53 @@
           <a:p>
             <a:r>
               <a:rPr lang="en-SG" dirty="0"/>
-              <a:t>References:</a:t>
+              <a:t>Sensor Kit </a:t>
+            </a:r>
+            <a:r>
+              <a:rPr lang="en-SG" dirty="0">
+                <a:hlinkClick r:id="rId2"/>
+              </a:rPr>
+              <a:t>37-in-1</a:t>
             </a:r>
             <a:endParaRPr lang="en-US" dirty="0"/>
           </a:p>
         </p:txBody>
       </p:sp>
-      <p:sp>
-        <p:nvSpPr>
-          <p:cNvPr id="6" name="Content Placeholder 5">
+      <p:pic>
+        <p:nvPicPr>
+          <p:cNvPr id="9" name="Content Placeholder 8">
             <a:extLst>
               <a:ext uri="{FF2B5EF4-FFF2-40B4-BE49-F238E27FC236}">
-                <a16:creationId xmlns:a16="http://schemas.microsoft.com/office/drawing/2014/main" id="{24BF2D0C-63C4-4A9F-B6F1-4B334E4138D4}"/>
+                <a16:creationId xmlns:a16="http://schemas.microsoft.com/office/drawing/2014/main" id="{27C38E4F-354B-452F-86A1-E3119147A382}"/>
+              </a:ext>
+            </a:extLst>
+          </p:cNvPr>
+          <p:cNvPicPr>
+            <a:picLocks noGrp="1" noChangeAspect="1"/>
+          </p:cNvPicPr>
+          <p:nvPr>
+            <p:ph sz="half" idx="1"/>
+          </p:nvPr>
+        </p:nvPicPr>
+        <p:blipFill>
+          <a:blip r:embed="rId3"/>
+          <a:stretch>
+            <a:fillRect/>
+          </a:stretch>
+        </p:blipFill>
+        <p:spPr>
+          <a:xfrm>
+            <a:off x="628650" y="1650569"/>
+            <a:ext cx="3886200" cy="3886200"/>
+          </a:xfrm>
+        </p:spPr>
+      </p:pic>
+      <p:sp>
+        <p:nvSpPr>
+          <p:cNvPr id="4" name="Content Placeholder 3">
+            <a:extLst>
+              <a:ext uri="{FF2B5EF4-FFF2-40B4-BE49-F238E27FC236}">
+                <a16:creationId xmlns:a16="http://schemas.microsoft.com/office/drawing/2014/main" id="{EF6CC12B-F272-4C21-A425-C5CA54C6B5EE}"/>
               </a:ext>
             </a:extLst>
           </p:cNvPr>
@@ -8444,7 +9122,7 @@
             <a:spLocks noGrp="1"/>
           </p:cNvSpPr>
           <p:nvPr>
-            <p:ph idx="1"/>
+            <p:ph sz="half" idx="2"/>
           </p:nvPr>
         </p:nvSpPr>
         <p:spPr/>
@@ -8453,48 +9131,44 @@
           <a:lstStyle/>
           <a:p>
             <a:r>
-              <a:rPr lang="en-SG" dirty="0" err="1">
-                <a:hlinkClick r:id="rId2"/>
-              </a:rPr>
-              <a:t>Dronebot</a:t>
-            </a:r>
-            <a:r>
-              <a:rPr lang="en-SG" dirty="0">
-                <a:hlinkClick r:id="rId2"/>
-              </a:rPr>
-              <a:t> workshop</a:t>
-            </a:r>
-            <a:endParaRPr lang="en-SG" dirty="0"/>
-          </a:p>
-          <a:p>
-            <a:r>
-              <a:rPr lang="en-SG" dirty="0">
-                <a:hlinkClick r:id="rId3"/>
-              </a:rPr>
-              <a:t>Last Minute Engineers</a:t>
-            </a:r>
-            <a:endParaRPr lang="en-SG" dirty="0"/>
-          </a:p>
-          <a:p>
-            <a:r>
-              <a:rPr lang="en-SG" dirty="0">
+              <a:rPr lang="en-SG" sz="2400" dirty="0"/>
+              <a:t>Almost all physical properties can be measured.</a:t>
+            </a:r>
+          </a:p>
+          <a:p>
+            <a:r>
+              <a:rPr lang="en-SG" sz="2400" dirty="0"/>
+              <a:t>Affordable way of learning how to work with sensors.</a:t>
+            </a:r>
+          </a:p>
+          <a:p>
+            <a:r>
+              <a:rPr lang="en-SG" sz="2400" dirty="0">
                 <a:hlinkClick r:id="rId4"/>
               </a:rPr>
-              <a:t>Arduino Project Hub</a:t>
-            </a:r>
-            <a:endParaRPr lang="en-SG" dirty="0"/>
-          </a:p>
-          <a:p>
-            <a:r>
-              <a:rPr lang="en-SG" dirty="0" err="1">
+              <a:t>Code</a:t>
+            </a:r>
+            <a:r>
+              <a:rPr lang="en-SG" sz="2400" dirty="0"/>
+              <a:t> &amp; </a:t>
+            </a:r>
+            <a:r>
+              <a:rPr lang="en-SG" sz="2400" dirty="0">
                 <a:hlinkClick r:id="rId5"/>
               </a:rPr>
-              <a:t>Instructables</a:t>
-            </a:r>
-            <a:endParaRPr lang="en-SG" dirty="0"/>
-          </a:p>
-          <a:p>
-            <a:endParaRPr lang="en-US" dirty="0"/>
+              <a:t>Tutorials</a:t>
+            </a:r>
+            <a:r>
+              <a:rPr lang="en-SG" sz="2400" dirty="0"/>
+              <a:t> available</a:t>
+            </a:r>
+          </a:p>
+          <a:p>
+            <a:r>
+              <a:rPr lang="en-SG" sz="2400" dirty="0"/>
+              <a:t>Libraries and simplicity make the Arduino system popular.</a:t>
+            </a:r>
+            <a:endParaRPr lang="en-US" sz="2400" dirty="0"/>
           </a:p>
         </p:txBody>
       </p:sp>
@@ -8503,7 +9177,7 @@
           <p:cNvPr id="5" name="Slide Number Placeholder 4">
             <a:extLst>
               <a:ext uri="{FF2B5EF4-FFF2-40B4-BE49-F238E27FC236}">
-                <a16:creationId xmlns:a16="http://schemas.microsoft.com/office/drawing/2014/main" id="{1C66DE5E-787C-49AB-8BF2-C7E362F8EFFD}"/>
+                <a16:creationId xmlns:a16="http://schemas.microsoft.com/office/drawing/2014/main" id="{08C95BB6-EA7C-4111-AF17-F5F82542C23A}"/>
               </a:ext>
             </a:extLst>
           </p:cNvPr>
@@ -8521,16 +9195,53 @@
           <a:p>
             <a:fld id="{CAB166B3-F268-4CEF-878A-CFB0D0D505D3}" type="slidenum">
               <a:rPr lang="en-US" smtClean="0"/>
-              <a:t>15</a:t>
+              <a:t>18</a:t>
             </a:fld>
             <a:endParaRPr lang="en-US"/>
+          </a:p>
+        </p:txBody>
+      </p:sp>
+      <p:sp>
+        <p:nvSpPr>
+          <p:cNvPr id="10" name="TextBox 9">
+            <a:extLst>
+              <a:ext uri="{FF2B5EF4-FFF2-40B4-BE49-F238E27FC236}">
+                <a16:creationId xmlns:a16="http://schemas.microsoft.com/office/drawing/2014/main" id="{78622092-56C4-4A56-A1A8-AC475CFB7711}"/>
+              </a:ext>
+            </a:extLst>
+          </p:cNvPr>
+          <p:cNvSpPr txBox="1"/>
+          <p:nvPr/>
+        </p:nvSpPr>
+        <p:spPr>
+          <a:xfrm>
+            <a:off x="750999" y="5673687"/>
+            <a:ext cx="3763851" cy="338554"/>
+          </a:xfrm>
+          <a:prstGeom prst="rect">
+            <a:avLst/>
+          </a:prstGeom>
+          <a:noFill/>
+        </p:spPr>
+        <p:txBody>
+          <a:bodyPr wrap="none" rtlCol="0">
+            <a:spAutoFit/>
+          </a:bodyPr>
+          <a:lstStyle/>
+          <a:p>
+            <a:pPr algn="l"/>
+            <a:r>
+              <a:rPr lang="en-SG" sz="1600" dirty="0"/>
+              <a:t>NB. Not all are sensors, some are actuators</a:t>
+            </a:r>
+            <a:endParaRPr lang="en-US" sz="1600" dirty="0"/>
           </a:p>
         </p:txBody>
       </p:sp>
     </p:spTree>
     <p:extLst>
       <p:ext uri="{BB962C8B-B14F-4D97-AF65-F5344CB8AC3E}">
-        <p14:creationId xmlns:p14="http://schemas.microsoft.com/office/powerpoint/2010/main" val="2210629397"/>
+        <p14:creationId xmlns:p14="http://schemas.microsoft.com/office/powerpoint/2010/main" val="599006691"/>
       </p:ext>
     </p:extLst>
   </p:cSld>
@@ -8540,7 +9251,7 @@
 </p:sld>
 </file>
 
-<file path=ppt/slides/slide16.xml><?xml version="1.0" encoding="utf-8"?>
+<file path=ppt/slides/slide19.xml><?xml version="1.0" encoding="utf-8"?>
 <p:sld xmlns:a="http://schemas.openxmlformats.org/drawingml/2006/main" xmlns:r="http://schemas.openxmlformats.org/officeDocument/2006/relationships" xmlns:p="http://schemas.openxmlformats.org/presentationml/2006/main">
   <p:cSld>
     <p:spTree>
@@ -8562,7 +9273,7 @@
           <p:cNvPr id="2" name="Title 1">
             <a:extLst>
               <a:ext uri="{FF2B5EF4-FFF2-40B4-BE49-F238E27FC236}">
-                <a16:creationId xmlns:a16="http://schemas.microsoft.com/office/drawing/2014/main" id="{29757EC0-C4C7-4C21-8BBD-162462AD095F}"/>
+                <a16:creationId xmlns:a16="http://schemas.microsoft.com/office/drawing/2014/main" id="{10D1060D-741A-499F-B6B6-DDFCEB7FC034}"/>
               </a:ext>
             </a:extLst>
           </p:cNvPr>
@@ -8570,7 +9281,7 @@
             <a:spLocks noGrp="1"/>
           </p:cNvSpPr>
           <p:nvPr>
-            <p:ph type="ctrTitle"/>
+            <p:ph type="title"/>
           </p:nvPr>
         </p:nvSpPr>
         <p:spPr/>
@@ -8579,18 +9290,19 @@
           <a:lstStyle/>
           <a:p>
             <a:r>
-              <a:rPr lang="en-US" dirty="0"/>
-              <a:t>EP1000</a:t>
-            </a:r>
-          </a:p>
-        </p:txBody>
-      </p:sp>
-      <p:sp>
-        <p:nvSpPr>
-          <p:cNvPr id="3" name="Subtitle 2">
+              <a:rPr lang="en-SG" dirty="0"/>
+              <a:t>References:</a:t>
+            </a:r>
+            <a:endParaRPr lang="en-US" dirty="0"/>
+          </a:p>
+        </p:txBody>
+      </p:sp>
+      <p:sp>
+        <p:nvSpPr>
+          <p:cNvPr id="6" name="Content Placeholder 5">
             <a:extLst>
               <a:ext uri="{FF2B5EF4-FFF2-40B4-BE49-F238E27FC236}">
-                <a16:creationId xmlns:a16="http://schemas.microsoft.com/office/drawing/2014/main" id="{1F579C3D-8773-4BAF-B0E2-847945ECA23E}"/>
+                <a16:creationId xmlns:a16="http://schemas.microsoft.com/office/drawing/2014/main" id="{24BF2D0C-63C4-4A9F-B6F1-4B334E4138D4}"/>
               </a:ext>
             </a:extLst>
           </p:cNvPr>
@@ -8598,7 +9310,7 @@
             <a:spLocks noGrp="1"/>
           </p:cNvSpPr>
           <p:nvPr>
-            <p:ph type="subTitle" idx="1"/>
+            <p:ph idx="1"/>
           </p:nvPr>
         </p:nvSpPr>
         <p:spPr/>
@@ -8607,26 +9319,84 @@
           <a:lstStyle/>
           <a:p>
             <a:r>
-              <a:rPr lang="en-US" dirty="0"/>
-              <a:t>Sensors</a:t>
-            </a:r>
-          </a:p>
-          <a:p>
-            <a:r>
-              <a:rPr lang="en-US" dirty="0">
-                <a:solidFill>
-                  <a:srgbClr val="FF0000"/>
-                </a:solidFill>
+              <a:rPr lang="en-SG" dirty="0" err="1">
+                <a:hlinkClick r:id="rId2"/>
               </a:rPr>
-              <a:t>End</a:t>
-            </a:r>
+              <a:t>Dronebot</a:t>
+            </a:r>
+            <a:r>
+              <a:rPr lang="en-SG" dirty="0">
+                <a:hlinkClick r:id="rId2"/>
+              </a:rPr>
+              <a:t> workshop</a:t>
+            </a:r>
+            <a:endParaRPr lang="en-SG" dirty="0"/>
+          </a:p>
+          <a:p>
+            <a:r>
+              <a:rPr lang="en-SG" dirty="0">
+                <a:hlinkClick r:id="rId3"/>
+              </a:rPr>
+              <a:t>Last Minute Engineers</a:t>
+            </a:r>
+            <a:endParaRPr lang="en-SG" dirty="0"/>
+          </a:p>
+          <a:p>
+            <a:r>
+              <a:rPr lang="en-SG" dirty="0">
+                <a:hlinkClick r:id="rId4"/>
+              </a:rPr>
+              <a:t>Arduino Project Hub</a:t>
+            </a:r>
+            <a:endParaRPr lang="en-SG" dirty="0"/>
+          </a:p>
+          <a:p>
+            <a:r>
+              <a:rPr lang="en-SG" dirty="0" err="1">
+                <a:hlinkClick r:id="rId5"/>
+              </a:rPr>
+              <a:t>Instructables</a:t>
+            </a:r>
+            <a:endParaRPr lang="en-SG" dirty="0"/>
+          </a:p>
+          <a:p>
+            <a:endParaRPr lang="en-US" dirty="0"/>
+          </a:p>
+        </p:txBody>
+      </p:sp>
+      <p:sp>
+        <p:nvSpPr>
+          <p:cNvPr id="5" name="Slide Number Placeholder 4">
+            <a:extLst>
+              <a:ext uri="{FF2B5EF4-FFF2-40B4-BE49-F238E27FC236}">
+                <a16:creationId xmlns:a16="http://schemas.microsoft.com/office/drawing/2014/main" id="{1C66DE5E-787C-49AB-8BF2-C7E362F8EFFD}"/>
+              </a:ext>
+            </a:extLst>
+          </p:cNvPr>
+          <p:cNvSpPr>
+            <a:spLocks noGrp="1"/>
+          </p:cNvSpPr>
+          <p:nvPr>
+            <p:ph type="sldNum" sz="quarter" idx="12"/>
+          </p:nvPr>
+        </p:nvSpPr>
+        <p:spPr/>
+        <p:txBody>
+          <a:bodyPr/>
+          <a:lstStyle/>
+          <a:p>
+            <a:fld id="{CAB166B3-F268-4CEF-878A-CFB0D0D505D3}" type="slidenum">
+              <a:rPr lang="en-US" smtClean="0"/>
+              <a:t>19</a:t>
+            </a:fld>
+            <a:endParaRPr lang="en-US"/>
           </a:p>
         </p:txBody>
       </p:sp>
     </p:spTree>
     <p:extLst>
       <p:ext uri="{BB962C8B-B14F-4D97-AF65-F5344CB8AC3E}">
-        <p14:creationId xmlns:p14="http://schemas.microsoft.com/office/powerpoint/2010/main" val="2293809126"/>
+        <p14:creationId xmlns:p14="http://schemas.microsoft.com/office/powerpoint/2010/main" val="2210629397"/>
       </p:ext>
     </p:extLst>
   </p:cSld>
@@ -8810,6 +9580,102 @@
     <p:extLst>
       <p:ext uri="{BB962C8B-B14F-4D97-AF65-F5344CB8AC3E}">
         <p14:creationId xmlns:p14="http://schemas.microsoft.com/office/powerpoint/2010/main" val="1205528300"/>
+      </p:ext>
+    </p:extLst>
+  </p:cSld>
+  <p:clrMapOvr>
+    <a:masterClrMapping/>
+  </p:clrMapOvr>
+</p:sld>
+</file>
+
+<file path=ppt/slides/slide20.xml><?xml version="1.0" encoding="utf-8"?>
+<p:sld xmlns:a="http://schemas.openxmlformats.org/drawingml/2006/main" xmlns:r="http://schemas.openxmlformats.org/officeDocument/2006/relationships" xmlns:p="http://schemas.openxmlformats.org/presentationml/2006/main">
+  <p:cSld>
+    <p:spTree>
+      <p:nvGrpSpPr>
+        <p:cNvPr id="1" name=""/>
+        <p:cNvGrpSpPr/>
+        <p:nvPr/>
+      </p:nvGrpSpPr>
+      <p:grpSpPr>
+        <a:xfrm>
+          <a:off x="0" y="0"/>
+          <a:ext cx="0" cy="0"/>
+          <a:chOff x="0" y="0"/>
+          <a:chExt cx="0" cy="0"/>
+        </a:xfrm>
+      </p:grpSpPr>
+      <p:sp>
+        <p:nvSpPr>
+          <p:cNvPr id="2" name="Title 1">
+            <a:extLst>
+              <a:ext uri="{FF2B5EF4-FFF2-40B4-BE49-F238E27FC236}">
+                <a16:creationId xmlns:a16="http://schemas.microsoft.com/office/drawing/2014/main" id="{29757EC0-C4C7-4C21-8BBD-162462AD095F}"/>
+              </a:ext>
+            </a:extLst>
+          </p:cNvPr>
+          <p:cNvSpPr>
+            <a:spLocks noGrp="1"/>
+          </p:cNvSpPr>
+          <p:nvPr>
+            <p:ph type="ctrTitle"/>
+          </p:nvPr>
+        </p:nvSpPr>
+        <p:spPr/>
+        <p:txBody>
+          <a:bodyPr/>
+          <a:lstStyle/>
+          <a:p>
+            <a:r>
+              <a:rPr lang="en-US" dirty="0"/>
+              <a:t>EP1000</a:t>
+            </a:r>
+          </a:p>
+        </p:txBody>
+      </p:sp>
+      <p:sp>
+        <p:nvSpPr>
+          <p:cNvPr id="3" name="Subtitle 2">
+            <a:extLst>
+              <a:ext uri="{FF2B5EF4-FFF2-40B4-BE49-F238E27FC236}">
+                <a16:creationId xmlns:a16="http://schemas.microsoft.com/office/drawing/2014/main" id="{1F579C3D-8773-4BAF-B0E2-847945ECA23E}"/>
+              </a:ext>
+            </a:extLst>
+          </p:cNvPr>
+          <p:cNvSpPr>
+            <a:spLocks noGrp="1"/>
+          </p:cNvSpPr>
+          <p:nvPr>
+            <p:ph type="subTitle" idx="1"/>
+          </p:nvPr>
+        </p:nvSpPr>
+        <p:spPr/>
+        <p:txBody>
+          <a:bodyPr/>
+          <a:lstStyle/>
+          <a:p>
+            <a:r>
+              <a:rPr lang="en-US" dirty="0"/>
+              <a:t>Sensors</a:t>
+            </a:r>
+          </a:p>
+          <a:p>
+            <a:r>
+              <a:rPr lang="en-US" dirty="0">
+                <a:solidFill>
+                  <a:srgbClr val="FF0000"/>
+                </a:solidFill>
+              </a:rPr>
+              <a:t>End</a:t>
+            </a:r>
+          </a:p>
+        </p:txBody>
+      </p:sp>
+    </p:spTree>
+    <p:extLst>
+      <p:ext uri="{BB962C8B-B14F-4D97-AF65-F5344CB8AC3E}">
+        <p14:creationId xmlns:p14="http://schemas.microsoft.com/office/powerpoint/2010/main" val="2293809126"/>
       </p:ext>
     </p:extLst>
   </p:cSld>
@@ -10140,6 +11006,560 @@
           <p:cNvPr id="2" name="Title 1">
             <a:extLst>
               <a:ext uri="{FF2B5EF4-FFF2-40B4-BE49-F238E27FC236}">
+                <a16:creationId xmlns:a16="http://schemas.microsoft.com/office/drawing/2014/main" id="{4B3DB41E-0C88-4CE9-AEA7-7C577913DDD0}"/>
+              </a:ext>
+            </a:extLst>
+          </p:cNvPr>
+          <p:cNvSpPr>
+            <a:spLocks noGrp="1"/>
+          </p:cNvSpPr>
+          <p:nvPr>
+            <p:ph type="title"/>
+          </p:nvPr>
+        </p:nvSpPr>
+        <p:spPr/>
+        <p:txBody>
+          <a:bodyPr/>
+          <a:lstStyle/>
+          <a:p>
+            <a:r>
+              <a:rPr lang="en-SG" dirty="0"/>
+              <a:t>Infra Red Remote Control</a:t>
+            </a:r>
+            <a:endParaRPr lang="en-US" dirty="0"/>
+          </a:p>
+        </p:txBody>
+      </p:sp>
+      <p:sp>
+        <p:nvSpPr>
+          <p:cNvPr id="3" name="Content Placeholder 2">
+            <a:extLst>
+              <a:ext uri="{FF2B5EF4-FFF2-40B4-BE49-F238E27FC236}">
+                <a16:creationId xmlns:a16="http://schemas.microsoft.com/office/drawing/2014/main" id="{39921810-F357-4EA6-B220-821699596D7B}"/>
+              </a:ext>
+            </a:extLst>
+          </p:cNvPr>
+          <p:cNvSpPr>
+            <a:spLocks noGrp="1"/>
+          </p:cNvSpPr>
+          <p:nvPr>
+            <p:ph idx="1"/>
+          </p:nvPr>
+        </p:nvSpPr>
+        <p:spPr/>
+        <p:txBody>
+          <a:bodyPr/>
+          <a:lstStyle/>
+          <a:p>
+            <a:r>
+              <a:rPr lang="en-SG" sz="2000" dirty="0"/>
+              <a:t>Alternative method of providing input to a project.</a:t>
+            </a:r>
+          </a:p>
+          <a:p>
+            <a:r>
+              <a:rPr lang="en-SG" sz="2000" dirty="0"/>
+              <a:t>The Remote control sends Infra Red (IR) pulses which carry a code.</a:t>
+            </a:r>
+            <a:br>
+              <a:rPr lang="en-SG" sz="2000" dirty="0"/>
+            </a:br>
+            <a:r>
+              <a:rPr lang="en-SG" sz="2000" dirty="0"/>
+              <a:t>An IR receiver reads the pulses and sends it to the controller input pin</a:t>
+            </a:r>
+            <a:br>
+              <a:rPr lang="en-SG" sz="2000" dirty="0"/>
+            </a:br>
+            <a:r>
+              <a:rPr lang="en-SG" sz="2000" dirty="0"/>
+              <a:t>Microcontroller decodes the pulses</a:t>
+            </a:r>
+          </a:p>
+          <a:p>
+            <a:r>
+              <a:rPr lang="en-SG" sz="2000" dirty="0"/>
+              <a:t>Library: </a:t>
+            </a:r>
+            <a:r>
+              <a:rPr lang="en-SG" sz="2000" dirty="0">
+                <a:hlinkClick r:id="rId2"/>
+              </a:rPr>
+              <a:t>Arduino </a:t>
+            </a:r>
+            <a:r>
+              <a:rPr lang="en-SG" sz="2000" dirty="0" err="1">
+                <a:hlinkClick r:id="rId2"/>
+              </a:rPr>
+              <a:t>IRRemote</a:t>
+            </a:r>
+            <a:br>
+              <a:rPr lang="en-SG" sz="2000" dirty="0"/>
+            </a:br>
+            <a:r>
+              <a:rPr lang="en-SG" sz="2000" dirty="0"/>
+              <a:t>Simple and can be used with a variety of commercial remotes</a:t>
+            </a:r>
+          </a:p>
+          <a:p>
+            <a:r>
+              <a:rPr lang="en-SG" sz="2000" dirty="0"/>
+              <a:t>Simplest is to use it with the </a:t>
+            </a:r>
+            <a:r>
+              <a:rPr lang="en-SG" sz="2000" dirty="0" err="1"/>
+              <a:t>IRReceiver</a:t>
+            </a:r>
+            <a:r>
+              <a:rPr lang="en-SG" sz="2000" dirty="0"/>
+              <a:t> and Control for Arduino Kits</a:t>
+            </a:r>
+          </a:p>
+          <a:p>
+            <a:r>
+              <a:rPr lang="en-SG" sz="2000" dirty="0"/>
+              <a:t>A very good YouTube tutorial: </a:t>
+            </a:r>
+            <a:r>
+              <a:rPr lang="en-SG" sz="2000" dirty="0" err="1"/>
+              <a:t>DroneBot</a:t>
+            </a:r>
+            <a:r>
+              <a:rPr lang="en-SG" sz="2000" dirty="0"/>
+              <a:t> Workshop: </a:t>
+            </a:r>
+            <a:r>
+              <a:rPr lang="en-SG" sz="2000" dirty="0">
+                <a:hlinkClick r:id="rId3"/>
+              </a:rPr>
+              <a:t>Using IR Remote Controls with Arduino</a:t>
+            </a:r>
+            <a:endParaRPr lang="en-SG" sz="2000" dirty="0"/>
+          </a:p>
+          <a:p>
+            <a:r>
+              <a:rPr lang="en-SG" sz="2000" dirty="0"/>
+              <a:t>Can be simulated with </a:t>
+            </a:r>
+            <a:r>
+              <a:rPr lang="en-SG" sz="2000" dirty="0" err="1"/>
+              <a:t>TinkerCAD</a:t>
+            </a:r>
+            <a:endParaRPr lang="en-US" sz="2000" dirty="0"/>
+          </a:p>
+        </p:txBody>
+      </p:sp>
+      <p:sp>
+        <p:nvSpPr>
+          <p:cNvPr id="5" name="Slide Number Placeholder 4">
+            <a:extLst>
+              <a:ext uri="{FF2B5EF4-FFF2-40B4-BE49-F238E27FC236}">
+                <a16:creationId xmlns:a16="http://schemas.microsoft.com/office/drawing/2014/main" id="{1D3966F9-4F7F-4D31-B67B-84D9D49B5AA0}"/>
+              </a:ext>
+            </a:extLst>
+          </p:cNvPr>
+          <p:cNvSpPr>
+            <a:spLocks noGrp="1"/>
+          </p:cNvSpPr>
+          <p:nvPr>
+            <p:ph type="sldNum" sz="quarter" idx="12"/>
+          </p:nvPr>
+        </p:nvSpPr>
+        <p:spPr/>
+        <p:txBody>
+          <a:bodyPr/>
+          <a:lstStyle/>
+          <a:p>
+            <a:fld id="{CAB166B3-F268-4CEF-878A-CFB0D0D505D3}" type="slidenum">
+              <a:rPr lang="en-US" smtClean="0"/>
+              <a:t>6</a:t>
+            </a:fld>
+            <a:endParaRPr lang="en-US"/>
+          </a:p>
+        </p:txBody>
+      </p:sp>
+    </p:spTree>
+    <p:extLst>
+      <p:ext uri="{BB962C8B-B14F-4D97-AF65-F5344CB8AC3E}">
+        <p14:creationId xmlns:p14="http://schemas.microsoft.com/office/powerpoint/2010/main" val="2693016922"/>
+      </p:ext>
+    </p:extLst>
+  </p:cSld>
+  <p:clrMapOvr>
+    <a:masterClrMapping/>
+  </p:clrMapOvr>
+</p:sld>
+</file>
+
+<file path=ppt/slides/slide7.xml><?xml version="1.0" encoding="utf-8"?>
+<p:sld xmlns:a="http://schemas.openxmlformats.org/drawingml/2006/main" xmlns:r="http://schemas.openxmlformats.org/officeDocument/2006/relationships" xmlns:p="http://schemas.openxmlformats.org/presentationml/2006/main">
+  <p:cSld>
+    <p:spTree>
+      <p:nvGrpSpPr>
+        <p:cNvPr id="1" name=""/>
+        <p:cNvGrpSpPr/>
+        <p:nvPr/>
+      </p:nvGrpSpPr>
+      <p:grpSpPr>
+        <a:xfrm>
+          <a:off x="0" y="0"/>
+          <a:ext cx="0" cy="0"/>
+          <a:chOff x="0" y="0"/>
+          <a:chExt cx="0" cy="0"/>
+        </a:xfrm>
+      </p:grpSpPr>
+      <p:sp>
+        <p:nvSpPr>
+          <p:cNvPr id="2" name="Title 1">
+            <a:extLst>
+              <a:ext uri="{FF2B5EF4-FFF2-40B4-BE49-F238E27FC236}">
+                <a16:creationId xmlns:a16="http://schemas.microsoft.com/office/drawing/2014/main" id="{39196ED9-F283-4450-B137-D11F2E8911CC}"/>
+              </a:ext>
+            </a:extLst>
+          </p:cNvPr>
+          <p:cNvSpPr>
+            <a:spLocks noGrp="1"/>
+          </p:cNvSpPr>
+          <p:nvPr>
+            <p:ph type="title"/>
+          </p:nvPr>
+        </p:nvSpPr>
+        <p:spPr/>
+        <p:txBody>
+          <a:bodyPr/>
+          <a:lstStyle/>
+          <a:p>
+            <a:r>
+              <a:rPr lang="en-SG" dirty="0" err="1"/>
+              <a:t>IRRemote</a:t>
+            </a:r>
+            <a:r>
+              <a:rPr lang="en-SG" dirty="0"/>
+              <a:t> Example</a:t>
+            </a:r>
+            <a:endParaRPr lang="en-US" dirty="0"/>
+          </a:p>
+        </p:txBody>
+      </p:sp>
+      <p:sp>
+        <p:nvSpPr>
+          <p:cNvPr id="6" name="Content Placeholder 5">
+            <a:extLst>
+              <a:ext uri="{FF2B5EF4-FFF2-40B4-BE49-F238E27FC236}">
+                <a16:creationId xmlns:a16="http://schemas.microsoft.com/office/drawing/2014/main" id="{68B6ECFC-CB5F-49F6-8AA0-8607DE3D4311}"/>
+              </a:ext>
+            </a:extLst>
+          </p:cNvPr>
+          <p:cNvSpPr>
+            <a:spLocks noGrp="1"/>
+          </p:cNvSpPr>
+          <p:nvPr>
+            <p:ph sz="half" idx="2"/>
+          </p:nvPr>
+        </p:nvSpPr>
+        <p:spPr/>
+        <p:txBody>
+          <a:bodyPr/>
+          <a:lstStyle/>
+          <a:p>
+            <a:r>
+              <a:rPr lang="en-SG" sz="2000" dirty="0">
+                <a:hlinkClick r:id="rId2"/>
+              </a:rPr>
+              <a:t>Uno </a:t>
+            </a:r>
+            <a:r>
+              <a:rPr lang="en-SG" sz="2000" dirty="0" err="1">
+                <a:hlinkClick r:id="rId2"/>
+              </a:rPr>
+              <a:t>IRRemote</a:t>
+            </a:r>
+            <a:r>
+              <a:rPr lang="en-SG" sz="2000" dirty="0">
+                <a:hlinkClick r:id="rId2"/>
+              </a:rPr>
+              <a:t> Control</a:t>
+            </a:r>
+            <a:endParaRPr lang="en-SG" sz="2000" dirty="0"/>
+          </a:p>
+          <a:p>
+            <a:r>
+              <a:rPr lang="en-SG" sz="2000" dirty="0"/>
+              <a:t>Use Serial Monitor to determine the hex codes before writing the application for the IR Remote</a:t>
+            </a:r>
+          </a:p>
+          <a:p>
+            <a:r>
+              <a:rPr lang="en-SG" sz="2000" dirty="0"/>
+              <a:t>Example:</a:t>
+            </a:r>
+          </a:p>
+          <a:p>
+            <a:pPr lvl="1"/>
+            <a:r>
+              <a:rPr lang="en-SG" sz="1600" dirty="0"/>
+              <a:t>Key 1 = 0xFD08F7</a:t>
+            </a:r>
+          </a:p>
+          <a:p>
+            <a:pPr lvl="1"/>
+            <a:r>
+              <a:rPr lang="en-SG" sz="1600" dirty="0"/>
+              <a:t>Key 2 = 0xFD8877</a:t>
+            </a:r>
+          </a:p>
+          <a:p>
+            <a:r>
+              <a:rPr lang="en-SG" sz="2000" dirty="0"/>
+              <a:t>Use a switch-case to effect the applications to be done</a:t>
+            </a:r>
+            <a:endParaRPr lang="en-US" sz="2000" dirty="0"/>
+          </a:p>
+          <a:p>
+            <a:endParaRPr lang="en-US" sz="2000" dirty="0"/>
+          </a:p>
+        </p:txBody>
+      </p:sp>
+      <p:sp>
+        <p:nvSpPr>
+          <p:cNvPr id="4" name="Slide Number Placeholder 3">
+            <a:extLst>
+              <a:ext uri="{FF2B5EF4-FFF2-40B4-BE49-F238E27FC236}">
+                <a16:creationId xmlns:a16="http://schemas.microsoft.com/office/drawing/2014/main" id="{D761E132-D51A-447F-91D8-43F0D3C12FBC}"/>
+              </a:ext>
+            </a:extLst>
+          </p:cNvPr>
+          <p:cNvSpPr>
+            <a:spLocks noGrp="1"/>
+          </p:cNvSpPr>
+          <p:nvPr>
+            <p:ph type="sldNum" sz="quarter" idx="12"/>
+          </p:nvPr>
+        </p:nvSpPr>
+        <p:spPr/>
+        <p:txBody>
+          <a:bodyPr/>
+          <a:lstStyle/>
+          <a:p>
+            <a:fld id="{CAB166B3-F268-4CEF-878A-CFB0D0D505D3}" type="slidenum">
+              <a:rPr lang="en-US" smtClean="0"/>
+              <a:t>7</a:t>
+            </a:fld>
+            <a:endParaRPr lang="en-US"/>
+          </a:p>
+        </p:txBody>
+      </p:sp>
+      <p:pic>
+        <p:nvPicPr>
+          <p:cNvPr id="15" name="Content Placeholder 14">
+            <a:hlinkClick r:id="rId2"/>
+            <a:extLst>
+              <a:ext uri="{FF2B5EF4-FFF2-40B4-BE49-F238E27FC236}">
+                <a16:creationId xmlns:a16="http://schemas.microsoft.com/office/drawing/2014/main" id="{D8CCD8BA-B7D2-4E28-BE11-4119A167FA83}"/>
+              </a:ext>
+            </a:extLst>
+          </p:cNvPr>
+          <p:cNvPicPr>
+            <a:picLocks noGrp="1" noChangeAspect="1"/>
+          </p:cNvPicPr>
+          <p:nvPr>
+            <p:ph sz="half" idx="1"/>
+          </p:nvPr>
+        </p:nvPicPr>
+        <p:blipFill>
+          <a:blip r:embed="rId3"/>
+          <a:stretch>
+            <a:fillRect/>
+          </a:stretch>
+        </p:blipFill>
+        <p:spPr>
+          <a:xfrm>
+            <a:off x="628650" y="1910709"/>
+            <a:ext cx="3886200" cy="3123549"/>
+          </a:xfrm>
+        </p:spPr>
+      </p:pic>
+    </p:spTree>
+    <p:extLst>
+      <p:ext uri="{BB962C8B-B14F-4D97-AF65-F5344CB8AC3E}">
+        <p14:creationId xmlns:p14="http://schemas.microsoft.com/office/powerpoint/2010/main" val="2013135741"/>
+      </p:ext>
+    </p:extLst>
+  </p:cSld>
+  <p:clrMapOvr>
+    <a:masterClrMapping/>
+  </p:clrMapOvr>
+</p:sld>
+</file>
+
+<file path=ppt/slides/slide8.xml><?xml version="1.0" encoding="utf-8"?>
+<p:sld xmlns:a="http://schemas.openxmlformats.org/drawingml/2006/main" xmlns:r="http://schemas.openxmlformats.org/officeDocument/2006/relationships" xmlns:p="http://schemas.openxmlformats.org/presentationml/2006/main">
+  <p:cSld>
+    <p:spTree>
+      <p:nvGrpSpPr>
+        <p:cNvPr id="1" name=""/>
+        <p:cNvGrpSpPr/>
+        <p:nvPr/>
+      </p:nvGrpSpPr>
+      <p:grpSpPr>
+        <a:xfrm>
+          <a:off x="0" y="0"/>
+          <a:ext cx="0" cy="0"/>
+          <a:chOff x="0" y="0"/>
+          <a:chExt cx="0" cy="0"/>
+        </a:xfrm>
+      </p:grpSpPr>
+      <p:sp>
+        <p:nvSpPr>
+          <p:cNvPr id="2" name="Title 1">
+            <a:extLst>
+              <a:ext uri="{FF2B5EF4-FFF2-40B4-BE49-F238E27FC236}">
+                <a16:creationId xmlns:a16="http://schemas.microsoft.com/office/drawing/2014/main" id="{075E09D9-BB85-4C0B-952F-347246E8CF54}"/>
+              </a:ext>
+            </a:extLst>
+          </p:cNvPr>
+          <p:cNvSpPr>
+            <a:spLocks noGrp="1"/>
+          </p:cNvSpPr>
+          <p:nvPr>
+            <p:ph type="title"/>
+          </p:nvPr>
+        </p:nvSpPr>
+        <p:spPr/>
+        <p:txBody>
+          <a:bodyPr/>
+          <a:lstStyle/>
+          <a:p>
+            <a:r>
+              <a:rPr lang="en-SG" dirty="0"/>
+              <a:t>IR Remote code</a:t>
+            </a:r>
+            <a:endParaRPr lang="en-US" dirty="0"/>
+          </a:p>
+        </p:txBody>
+      </p:sp>
+      <p:pic>
+        <p:nvPicPr>
+          <p:cNvPr id="9" name="Content Placeholder 8">
+            <a:extLst>
+              <a:ext uri="{FF2B5EF4-FFF2-40B4-BE49-F238E27FC236}">
+                <a16:creationId xmlns:a16="http://schemas.microsoft.com/office/drawing/2014/main" id="{695CD8F1-01CD-4723-99A2-67EB10DB7C91}"/>
+              </a:ext>
+            </a:extLst>
+          </p:cNvPr>
+          <p:cNvPicPr>
+            <a:picLocks noGrp="1" noChangeAspect="1"/>
+          </p:cNvPicPr>
+          <p:nvPr>
+            <p:ph sz="half" idx="1"/>
+          </p:nvPr>
+        </p:nvPicPr>
+        <p:blipFill>
+          <a:blip r:embed="rId2"/>
+          <a:stretch>
+            <a:fillRect/>
+          </a:stretch>
+        </p:blipFill>
+        <p:spPr>
+          <a:xfrm>
+            <a:off x="628650" y="1863196"/>
+            <a:ext cx="3886200" cy="4121957"/>
+          </a:xfrm>
+        </p:spPr>
+      </p:pic>
+      <p:pic>
+        <p:nvPicPr>
+          <p:cNvPr id="7" name="Content Placeholder 6">
+            <a:extLst>
+              <a:ext uri="{FF2B5EF4-FFF2-40B4-BE49-F238E27FC236}">
+                <a16:creationId xmlns:a16="http://schemas.microsoft.com/office/drawing/2014/main" id="{2FF7F67C-3BBE-4150-9FBA-6E1334ADFE91}"/>
+              </a:ext>
+            </a:extLst>
+          </p:cNvPr>
+          <p:cNvPicPr>
+            <a:picLocks noGrp="1" noChangeAspect="1"/>
+          </p:cNvPicPr>
+          <p:nvPr>
+            <p:ph sz="half" idx="2"/>
+          </p:nvPr>
+        </p:nvPicPr>
+        <p:blipFill>
+          <a:blip r:embed="rId3"/>
+          <a:stretch>
+            <a:fillRect/>
+          </a:stretch>
+        </p:blipFill>
+        <p:spPr>
+          <a:xfrm>
+            <a:off x="4775892" y="1825625"/>
+            <a:ext cx="3592716" cy="4351338"/>
+          </a:xfrm>
+        </p:spPr>
+      </p:pic>
+      <p:sp>
+        <p:nvSpPr>
+          <p:cNvPr id="5" name="Slide Number Placeholder 4">
+            <a:extLst>
+              <a:ext uri="{FF2B5EF4-FFF2-40B4-BE49-F238E27FC236}">
+                <a16:creationId xmlns:a16="http://schemas.microsoft.com/office/drawing/2014/main" id="{440E807C-A7CB-4E92-A3B7-8D4B92ACF88E}"/>
+              </a:ext>
+            </a:extLst>
+          </p:cNvPr>
+          <p:cNvSpPr>
+            <a:spLocks noGrp="1"/>
+          </p:cNvSpPr>
+          <p:nvPr>
+            <p:ph type="sldNum" sz="quarter" idx="12"/>
+          </p:nvPr>
+        </p:nvSpPr>
+        <p:spPr/>
+        <p:txBody>
+          <a:bodyPr/>
+          <a:lstStyle/>
+          <a:p>
+            <a:fld id="{CAB166B3-F268-4CEF-878A-CFB0D0D505D3}" type="slidenum">
+              <a:rPr lang="en-US" smtClean="0"/>
+              <a:t>8</a:t>
+            </a:fld>
+            <a:endParaRPr lang="en-US"/>
+          </a:p>
+        </p:txBody>
+      </p:sp>
+    </p:spTree>
+    <p:extLst>
+      <p:ext uri="{BB962C8B-B14F-4D97-AF65-F5344CB8AC3E}">
+        <p14:creationId xmlns:p14="http://schemas.microsoft.com/office/powerpoint/2010/main" val="83749616"/>
+      </p:ext>
+    </p:extLst>
+  </p:cSld>
+  <p:clrMapOvr>
+    <a:masterClrMapping/>
+  </p:clrMapOvr>
+</p:sld>
+</file>
+
+<file path=ppt/slides/slide9.xml><?xml version="1.0" encoding="utf-8"?>
+<p:sld xmlns:a="http://schemas.openxmlformats.org/drawingml/2006/main" xmlns:r="http://schemas.openxmlformats.org/officeDocument/2006/relationships" xmlns:p="http://schemas.openxmlformats.org/presentationml/2006/main">
+  <p:cSld>
+    <p:spTree>
+      <p:nvGrpSpPr>
+        <p:cNvPr id="1" name=""/>
+        <p:cNvGrpSpPr/>
+        <p:nvPr/>
+      </p:nvGrpSpPr>
+      <p:grpSpPr>
+        <a:xfrm>
+          <a:off x="0" y="0"/>
+          <a:ext cx="0" cy="0"/>
+          <a:chOff x="0" y="0"/>
+          <a:chExt cx="0" cy="0"/>
+        </a:xfrm>
+      </p:grpSpPr>
+      <p:sp>
+        <p:nvSpPr>
+          <p:cNvPr id="2" name="Title 1">
+            <a:extLst>
+              <a:ext uri="{FF2B5EF4-FFF2-40B4-BE49-F238E27FC236}">
                 <a16:creationId xmlns:a16="http://schemas.microsoft.com/office/drawing/2014/main" id="{C4B331DF-994E-4D7F-B17A-14AB1A9DFAB7}"/>
               </a:ext>
             </a:extLst>
@@ -10285,7 +11705,7 @@
           <a:p>
             <a:fld id="{CAB166B3-F268-4CEF-878A-CFB0D0D505D3}" type="slidenum">
               <a:rPr lang="en-US" smtClean="0"/>
-              <a:t>6</a:t>
+              <a:t>9</a:t>
             </a:fld>
             <a:endParaRPr lang="en-US"/>
           </a:p>
@@ -10325,645 +11745,6 @@
     <p:extLst>
       <p:ext uri="{BB962C8B-B14F-4D97-AF65-F5344CB8AC3E}">
         <p14:creationId xmlns:p14="http://schemas.microsoft.com/office/powerpoint/2010/main" val="691087023"/>
-      </p:ext>
-    </p:extLst>
-  </p:cSld>
-  <p:clrMapOvr>
-    <a:masterClrMapping/>
-  </p:clrMapOvr>
-</p:sld>
-</file>
-
-<file path=ppt/slides/slide7.xml><?xml version="1.0" encoding="utf-8"?>
-<p:sld xmlns:a="http://schemas.openxmlformats.org/drawingml/2006/main" xmlns:r="http://schemas.openxmlformats.org/officeDocument/2006/relationships" xmlns:p="http://schemas.openxmlformats.org/presentationml/2006/main">
-  <p:cSld>
-    <p:spTree>
-      <p:nvGrpSpPr>
-        <p:cNvPr id="1" name=""/>
-        <p:cNvGrpSpPr/>
-        <p:nvPr/>
-      </p:nvGrpSpPr>
-      <p:grpSpPr>
-        <a:xfrm>
-          <a:off x="0" y="0"/>
-          <a:ext cx="0" cy="0"/>
-          <a:chOff x="0" y="0"/>
-          <a:chExt cx="0" cy="0"/>
-        </a:xfrm>
-      </p:grpSpPr>
-      <p:sp>
-        <p:nvSpPr>
-          <p:cNvPr id="2" name="Title 1">
-            <a:extLst>
-              <a:ext uri="{FF2B5EF4-FFF2-40B4-BE49-F238E27FC236}">
-                <a16:creationId xmlns:a16="http://schemas.microsoft.com/office/drawing/2014/main" id="{C4B331DF-994E-4D7F-B17A-14AB1A9DFAB7}"/>
-              </a:ext>
-            </a:extLst>
-          </p:cNvPr>
-          <p:cNvSpPr>
-            <a:spLocks noGrp="1"/>
-          </p:cNvSpPr>
-          <p:nvPr>
-            <p:ph type="title"/>
-          </p:nvPr>
-        </p:nvSpPr>
-        <p:spPr/>
-        <p:txBody>
-          <a:bodyPr/>
-          <a:lstStyle/>
-          <a:p>
-            <a:r>
-              <a:rPr lang="en-SG" dirty="0"/>
-              <a:t>Measuring Distance – SR04</a:t>
-            </a:r>
-            <a:endParaRPr lang="en-US" dirty="0"/>
-          </a:p>
-        </p:txBody>
-      </p:sp>
-      <p:sp>
-        <p:nvSpPr>
-          <p:cNvPr id="5" name="Slide Number Placeholder 4">
-            <a:extLst>
-              <a:ext uri="{FF2B5EF4-FFF2-40B4-BE49-F238E27FC236}">
-                <a16:creationId xmlns:a16="http://schemas.microsoft.com/office/drawing/2014/main" id="{490BA051-1950-4D92-A9FE-F7CBD8B97C88}"/>
-              </a:ext>
-            </a:extLst>
-          </p:cNvPr>
-          <p:cNvSpPr>
-            <a:spLocks noGrp="1"/>
-          </p:cNvSpPr>
-          <p:nvPr>
-            <p:ph type="sldNum" sz="quarter" idx="12"/>
-          </p:nvPr>
-        </p:nvSpPr>
-        <p:spPr/>
-        <p:txBody>
-          <a:bodyPr/>
-          <a:lstStyle/>
-          <a:p>
-            <a:fld id="{CAB166B3-F268-4CEF-878A-CFB0D0D505D3}" type="slidenum">
-              <a:rPr lang="en-US" smtClean="0"/>
-              <a:t>7</a:t>
-            </a:fld>
-            <a:endParaRPr lang="en-US"/>
-          </a:p>
-        </p:txBody>
-      </p:sp>
-      <p:pic>
-        <p:nvPicPr>
-          <p:cNvPr id="12" name="Content Placeholder 11">
-            <a:extLst>
-              <a:ext uri="{FF2B5EF4-FFF2-40B4-BE49-F238E27FC236}">
-                <a16:creationId xmlns:a16="http://schemas.microsoft.com/office/drawing/2014/main" id="{0B0DA044-DCA1-4AC0-9E6E-34F2C03C526B}"/>
-              </a:ext>
-            </a:extLst>
-          </p:cNvPr>
-          <p:cNvPicPr>
-            <a:picLocks noGrp="1" noChangeAspect="1"/>
-          </p:cNvPicPr>
-          <p:nvPr>
-            <p:ph sz="half" idx="1"/>
-          </p:nvPr>
-        </p:nvPicPr>
-        <p:blipFill>
-          <a:blip r:embed="rId2"/>
-          <a:stretch>
-            <a:fillRect/>
-          </a:stretch>
-        </p:blipFill>
-        <p:spPr>
-          <a:xfrm>
-            <a:off x="628650" y="1562197"/>
-            <a:ext cx="7034022" cy="3500223"/>
-          </a:xfrm>
-        </p:spPr>
-      </p:pic>
-      <p:sp>
-        <p:nvSpPr>
-          <p:cNvPr id="9" name="Content Placeholder 8">
-            <a:extLst>
-              <a:ext uri="{FF2B5EF4-FFF2-40B4-BE49-F238E27FC236}">
-                <a16:creationId xmlns:a16="http://schemas.microsoft.com/office/drawing/2014/main" id="{67304A7D-DFB3-4C19-9972-36A8880F7F8E}"/>
-              </a:ext>
-            </a:extLst>
-          </p:cNvPr>
-          <p:cNvSpPr>
-            <a:spLocks noGrp="1"/>
-          </p:cNvSpPr>
-          <p:nvPr>
-            <p:ph sz="half" idx="2"/>
-          </p:nvPr>
-        </p:nvSpPr>
-        <p:spPr>
-          <a:xfrm>
-            <a:off x="628650" y="5162527"/>
-            <a:ext cx="7886700" cy="1193824"/>
-          </a:xfrm>
-        </p:spPr>
-        <p:txBody>
-          <a:bodyPr/>
-          <a:lstStyle/>
-          <a:p>
-            <a:r>
-              <a:rPr lang="en-SG" sz="1800" dirty="0"/>
-              <a:t>LOW pulse (10 mS) is used to trigger the sensor</a:t>
-            </a:r>
-          </a:p>
-          <a:p>
-            <a:r>
-              <a:rPr lang="en-SG" sz="1800" dirty="0"/>
-              <a:t>Return pulse is measured using </a:t>
-            </a:r>
-            <a:r>
-              <a:rPr lang="en-SG" sz="1800" dirty="0" err="1"/>
-              <a:t>pulseIn</a:t>
-            </a:r>
-            <a:r>
-              <a:rPr lang="en-SG" sz="1800" dirty="0"/>
-              <a:t>(), distance is proportional to pulse length</a:t>
-            </a:r>
-            <a:endParaRPr lang="en-US" sz="1800" dirty="0"/>
-          </a:p>
-        </p:txBody>
-      </p:sp>
-    </p:spTree>
-    <p:extLst>
-      <p:ext uri="{BB962C8B-B14F-4D97-AF65-F5344CB8AC3E}">
-        <p14:creationId xmlns:p14="http://schemas.microsoft.com/office/powerpoint/2010/main" val="3807239228"/>
-      </p:ext>
-    </p:extLst>
-  </p:cSld>
-  <p:clrMapOvr>
-    <a:masterClrMapping/>
-  </p:clrMapOvr>
-</p:sld>
-</file>
-
-<file path=ppt/slides/slide8.xml><?xml version="1.0" encoding="utf-8"?>
-<p:sld xmlns:a="http://schemas.openxmlformats.org/drawingml/2006/main" xmlns:r="http://schemas.openxmlformats.org/officeDocument/2006/relationships" xmlns:p="http://schemas.openxmlformats.org/presentationml/2006/main">
-  <p:cSld>
-    <p:spTree>
-      <p:nvGrpSpPr>
-        <p:cNvPr id="1" name=""/>
-        <p:cNvGrpSpPr/>
-        <p:nvPr/>
-      </p:nvGrpSpPr>
-      <p:grpSpPr>
-        <a:xfrm>
-          <a:off x="0" y="0"/>
-          <a:ext cx="0" cy="0"/>
-          <a:chOff x="0" y="0"/>
-          <a:chExt cx="0" cy="0"/>
-        </a:xfrm>
-      </p:grpSpPr>
-      <p:sp>
-        <p:nvSpPr>
-          <p:cNvPr id="2" name="Title 1">
-            <a:extLst>
-              <a:ext uri="{FF2B5EF4-FFF2-40B4-BE49-F238E27FC236}">
-                <a16:creationId xmlns:a16="http://schemas.microsoft.com/office/drawing/2014/main" id="{C69891C6-6E16-4AEE-87B8-57E6952D3C86}"/>
-              </a:ext>
-            </a:extLst>
-          </p:cNvPr>
-          <p:cNvSpPr>
-            <a:spLocks noGrp="1"/>
-          </p:cNvSpPr>
-          <p:nvPr>
-            <p:ph type="title"/>
-          </p:nvPr>
-        </p:nvSpPr>
-        <p:spPr/>
-        <p:txBody>
-          <a:bodyPr/>
-          <a:lstStyle/>
-          <a:p>
-            <a:r>
-              <a:rPr lang="en-SG" dirty="0"/>
-              <a:t>PIR Motion Sensor HC-SR501</a:t>
-            </a:r>
-            <a:endParaRPr lang="en-US" dirty="0"/>
-          </a:p>
-        </p:txBody>
-      </p:sp>
-      <p:sp>
-        <p:nvSpPr>
-          <p:cNvPr id="3" name="Content Placeholder 2">
-            <a:extLst>
-              <a:ext uri="{FF2B5EF4-FFF2-40B4-BE49-F238E27FC236}">
-                <a16:creationId xmlns:a16="http://schemas.microsoft.com/office/drawing/2014/main" id="{C98B88DC-3363-43A2-9635-845612A6B76C}"/>
-              </a:ext>
-            </a:extLst>
-          </p:cNvPr>
-          <p:cNvSpPr>
-            <a:spLocks noGrp="1"/>
-          </p:cNvSpPr>
-          <p:nvPr>
-            <p:ph sz="half" idx="1"/>
-          </p:nvPr>
-        </p:nvSpPr>
-        <p:spPr>
-          <a:xfrm>
-            <a:off x="628650" y="1627319"/>
-            <a:ext cx="3886200" cy="4351338"/>
-          </a:xfrm>
-        </p:spPr>
-        <p:txBody>
-          <a:bodyPr/>
-          <a:lstStyle/>
-          <a:p>
-            <a:r>
-              <a:rPr lang="en-SG" sz="2400" dirty="0">
-                <a:hlinkClick r:id="rId2"/>
-              </a:rPr>
-              <a:t>Passive Infra Red</a:t>
-            </a:r>
-            <a:r>
-              <a:rPr lang="en-SG" sz="2400" dirty="0"/>
-              <a:t> </a:t>
-            </a:r>
-          </a:p>
-          <a:p>
-            <a:r>
-              <a:rPr lang="en-SG" sz="2400" dirty="0"/>
-              <a:t>Detects motion</a:t>
-            </a:r>
-          </a:p>
-          <a:p>
-            <a:pPr lvl="1"/>
-            <a:r>
-              <a:rPr lang="en-SG" sz="2000" dirty="0"/>
-              <a:t>Adjust Sensitivity</a:t>
-            </a:r>
-          </a:p>
-          <a:p>
-            <a:pPr lvl="1"/>
-            <a:r>
-              <a:rPr lang="en-SG" sz="2000" dirty="0"/>
-              <a:t>Wait at least 15 s</a:t>
-            </a:r>
-          </a:p>
-          <a:p>
-            <a:r>
-              <a:rPr lang="en-SG" sz="2400" dirty="0"/>
-              <a:t>No Library required, 1 digital I/O input pin for status.</a:t>
-            </a:r>
-          </a:p>
-          <a:p>
-            <a:r>
-              <a:rPr lang="en-SG" sz="2400" dirty="0"/>
-              <a:t>Check pin</a:t>
-            </a:r>
-          </a:p>
-          <a:p>
-            <a:pPr lvl="1"/>
-            <a:r>
-              <a:rPr lang="en-SG" sz="2000" dirty="0"/>
-              <a:t>LOW no motion</a:t>
-            </a:r>
-          </a:p>
-          <a:p>
-            <a:pPr lvl="1"/>
-            <a:r>
-              <a:rPr lang="en-SG" sz="2000" dirty="0"/>
-              <a:t>HIGH motion detected</a:t>
-            </a:r>
-          </a:p>
-          <a:p>
-            <a:r>
-              <a:rPr lang="en-SG" sz="2400" dirty="0"/>
-              <a:t>Cannot measure distance</a:t>
-            </a:r>
-          </a:p>
-        </p:txBody>
-      </p:sp>
-      <p:sp>
-        <p:nvSpPr>
-          <p:cNvPr id="5" name="Slide Number Placeholder 4">
-            <a:extLst>
-              <a:ext uri="{FF2B5EF4-FFF2-40B4-BE49-F238E27FC236}">
-                <a16:creationId xmlns:a16="http://schemas.microsoft.com/office/drawing/2014/main" id="{56552937-2EC0-419A-9BF9-A8676C32A95C}"/>
-              </a:ext>
-            </a:extLst>
-          </p:cNvPr>
-          <p:cNvSpPr>
-            <a:spLocks noGrp="1"/>
-          </p:cNvSpPr>
-          <p:nvPr>
-            <p:ph type="sldNum" sz="quarter" idx="12"/>
-          </p:nvPr>
-        </p:nvSpPr>
-        <p:spPr/>
-        <p:txBody>
-          <a:bodyPr/>
-          <a:lstStyle/>
-          <a:p>
-            <a:fld id="{CAB166B3-F268-4CEF-878A-CFB0D0D505D3}" type="slidenum">
-              <a:rPr lang="en-US" smtClean="0"/>
-              <a:t>8</a:t>
-            </a:fld>
-            <a:endParaRPr lang="en-US"/>
-          </a:p>
-        </p:txBody>
-      </p:sp>
-      <p:pic>
-        <p:nvPicPr>
-          <p:cNvPr id="11" name="Content Placeholder 10">
-            <a:hlinkClick r:id="rId3"/>
-            <a:extLst>
-              <a:ext uri="{FF2B5EF4-FFF2-40B4-BE49-F238E27FC236}">
-                <a16:creationId xmlns:a16="http://schemas.microsoft.com/office/drawing/2014/main" id="{B6AC0092-B88F-4B2F-B88B-C29D5E2017E9}"/>
-              </a:ext>
-            </a:extLst>
-          </p:cNvPr>
-          <p:cNvPicPr>
-            <a:picLocks noGrp="1" noChangeAspect="1"/>
-          </p:cNvPicPr>
-          <p:nvPr>
-            <p:ph sz="half" idx="2"/>
-          </p:nvPr>
-        </p:nvPicPr>
-        <p:blipFill>
-          <a:blip r:embed="rId4"/>
-          <a:stretch>
-            <a:fillRect/>
-          </a:stretch>
-        </p:blipFill>
-        <p:spPr>
-          <a:xfrm>
-            <a:off x="4629150" y="1531546"/>
-            <a:ext cx="3886200" cy="3709554"/>
-          </a:xfrm>
-        </p:spPr>
-      </p:pic>
-      <p:sp>
-        <p:nvSpPr>
-          <p:cNvPr id="12" name="TextBox 11">
-            <a:extLst>
-              <a:ext uri="{FF2B5EF4-FFF2-40B4-BE49-F238E27FC236}">
-                <a16:creationId xmlns:a16="http://schemas.microsoft.com/office/drawing/2014/main" id="{C4C92BCE-E609-46A5-8E7B-D8F6E2B44E4D}"/>
-              </a:ext>
-            </a:extLst>
-          </p:cNvPr>
-          <p:cNvSpPr txBox="1"/>
-          <p:nvPr/>
-        </p:nvSpPr>
-        <p:spPr>
-          <a:xfrm>
-            <a:off x="4629150" y="5475383"/>
-            <a:ext cx="3886200" cy="830997"/>
-          </a:xfrm>
-          <a:prstGeom prst="rect">
-            <a:avLst/>
-          </a:prstGeom>
-          <a:noFill/>
-        </p:spPr>
-        <p:txBody>
-          <a:bodyPr wrap="square" rtlCol="0">
-            <a:spAutoFit/>
-          </a:bodyPr>
-          <a:lstStyle/>
-          <a:p>
-            <a:pPr algn="l"/>
-            <a:r>
-              <a:rPr lang="en-SG" sz="1600" dirty="0">
-                <a:hlinkClick r:id="rId3"/>
-              </a:rPr>
-              <a:t>Motion detection using PIR HC-SR501</a:t>
-            </a:r>
-            <a:endParaRPr lang="en-SG" sz="1600" dirty="0"/>
-          </a:p>
-          <a:p>
-            <a:pPr algn="l"/>
-            <a:r>
-              <a:rPr lang="en-SG" sz="1600" dirty="0"/>
-              <a:t>Better alternative: </a:t>
-            </a:r>
-            <a:r>
-              <a:rPr lang="en-SG" sz="1600" dirty="0">
-                <a:hlinkClick r:id="rId5"/>
-              </a:rPr>
-              <a:t>RCWL-0516 Microwave Proximity Sensor</a:t>
-            </a:r>
-            <a:endParaRPr lang="en-US" sz="1600" dirty="0"/>
-          </a:p>
-        </p:txBody>
-      </p:sp>
-    </p:spTree>
-    <p:extLst>
-      <p:ext uri="{BB962C8B-B14F-4D97-AF65-F5344CB8AC3E}">
-        <p14:creationId xmlns:p14="http://schemas.microsoft.com/office/powerpoint/2010/main" val="74894023"/>
-      </p:ext>
-    </p:extLst>
-  </p:cSld>
-  <p:clrMapOvr>
-    <a:masterClrMapping/>
-  </p:clrMapOvr>
-</p:sld>
-</file>
-
-<file path=ppt/slides/slide9.xml><?xml version="1.0" encoding="utf-8"?>
-<p:sld xmlns:a="http://schemas.openxmlformats.org/drawingml/2006/main" xmlns:r="http://schemas.openxmlformats.org/officeDocument/2006/relationships" xmlns:p="http://schemas.openxmlformats.org/presentationml/2006/main">
-  <p:cSld>
-    <p:spTree>
-      <p:nvGrpSpPr>
-        <p:cNvPr id="1" name=""/>
-        <p:cNvGrpSpPr/>
-        <p:nvPr/>
-      </p:nvGrpSpPr>
-      <p:grpSpPr>
-        <a:xfrm>
-          <a:off x="0" y="0"/>
-          <a:ext cx="0" cy="0"/>
-          <a:chOff x="0" y="0"/>
-          <a:chExt cx="0" cy="0"/>
-        </a:xfrm>
-      </p:grpSpPr>
-      <p:sp>
-        <p:nvSpPr>
-          <p:cNvPr id="2" name="Title 1">
-            <a:extLst>
-              <a:ext uri="{FF2B5EF4-FFF2-40B4-BE49-F238E27FC236}">
-                <a16:creationId xmlns:a16="http://schemas.microsoft.com/office/drawing/2014/main" id="{B8824EAC-CB23-4361-BF44-7DA2B4E3005D}"/>
-              </a:ext>
-            </a:extLst>
-          </p:cNvPr>
-          <p:cNvSpPr>
-            <a:spLocks noGrp="1"/>
-          </p:cNvSpPr>
-          <p:nvPr>
-            <p:ph type="title"/>
-          </p:nvPr>
-        </p:nvSpPr>
-        <p:spPr/>
-        <p:txBody>
-          <a:bodyPr/>
-          <a:lstStyle/>
-          <a:p>
-            <a:r>
-              <a:rPr lang="en-SG" dirty="0"/>
-              <a:t>Room Temperature &amp; Humidity</a:t>
-            </a:r>
-            <a:endParaRPr lang="en-US" dirty="0"/>
-          </a:p>
-        </p:txBody>
-      </p:sp>
-      <p:sp>
-        <p:nvSpPr>
-          <p:cNvPr id="3" name="Content Placeholder 2">
-            <a:extLst>
-              <a:ext uri="{FF2B5EF4-FFF2-40B4-BE49-F238E27FC236}">
-                <a16:creationId xmlns:a16="http://schemas.microsoft.com/office/drawing/2014/main" id="{31FAD7EA-FF5B-4DD0-826F-E70003B9618A}"/>
-              </a:ext>
-            </a:extLst>
-          </p:cNvPr>
-          <p:cNvSpPr>
-            <a:spLocks noGrp="1"/>
-          </p:cNvSpPr>
-          <p:nvPr>
-            <p:ph sz="half" idx="1"/>
-          </p:nvPr>
-        </p:nvSpPr>
-        <p:spPr/>
-        <p:txBody>
-          <a:bodyPr/>
-          <a:lstStyle/>
-          <a:p>
-            <a:r>
-              <a:rPr lang="en-SG" sz="1800" dirty="0">
-                <a:hlinkClick r:id="rId2"/>
-              </a:rPr>
-              <a:t>DHT-11</a:t>
-            </a:r>
-            <a:r>
-              <a:rPr lang="en-SG" sz="1800" dirty="0"/>
-              <a:t> Temperature and Humidity sensor</a:t>
-            </a:r>
-          </a:p>
-          <a:p>
-            <a:r>
-              <a:rPr lang="en-SG" sz="1800" dirty="0"/>
-              <a:t>20~80% humidity, 0~50</a:t>
-            </a:r>
-            <a:r>
-              <a:rPr lang="en-SG" sz="1800" baseline="30000" dirty="0"/>
-              <a:t>o</a:t>
-            </a:r>
-            <a:r>
-              <a:rPr lang="en-SG" sz="1800" dirty="0"/>
-              <a:t>C</a:t>
-            </a:r>
-            <a:br>
-              <a:rPr lang="en-SG" sz="1800" dirty="0"/>
-            </a:br>
-            <a:r>
-              <a:rPr lang="en-SG" sz="1800" dirty="0"/>
-              <a:t>1 Hz sampling rate.</a:t>
-            </a:r>
-          </a:p>
-          <a:p>
-            <a:r>
-              <a:rPr lang="en-SG" sz="1800" dirty="0">
-                <a:hlinkClick r:id="rId3"/>
-              </a:rPr>
-              <a:t>Library from Adafruit </a:t>
-            </a:r>
-            <a:r>
-              <a:rPr lang="en-SG" sz="1800" dirty="0"/>
-              <a:t>(install both):</a:t>
-            </a:r>
-          </a:p>
-          <a:p>
-            <a:pPr lvl="1"/>
-            <a:r>
-              <a:rPr lang="en-SG" sz="1600" dirty="0" err="1"/>
-              <a:t>TinyDHT</a:t>
-            </a:r>
-            <a:endParaRPr lang="en-SG" sz="1600" dirty="0"/>
-          </a:p>
-          <a:p>
-            <a:pPr lvl="1"/>
-            <a:r>
-              <a:rPr lang="en-SG" sz="1600" dirty="0" err="1"/>
-              <a:t>TinyWire</a:t>
-            </a:r>
-            <a:endParaRPr lang="en-SG" sz="1600" dirty="0"/>
-          </a:p>
-          <a:p>
-            <a:r>
-              <a:rPr lang="en-US" sz="2000" dirty="0"/>
-              <a:t>Requires 1 digital I/O pin</a:t>
-            </a:r>
-          </a:p>
-          <a:p>
-            <a:r>
-              <a:rPr lang="en-US" sz="2000" dirty="0"/>
-              <a:t>Better results, accuracy with the DHT-22, however, 2~3x more expensive</a:t>
-            </a:r>
-          </a:p>
-        </p:txBody>
-      </p:sp>
-      <p:pic>
-        <p:nvPicPr>
-          <p:cNvPr id="9" name="Content Placeholder 8">
-            <a:extLst>
-              <a:ext uri="{FF2B5EF4-FFF2-40B4-BE49-F238E27FC236}">
-                <a16:creationId xmlns:a16="http://schemas.microsoft.com/office/drawing/2014/main" id="{BCF0C9D3-90AC-4E12-A2D2-322FF77E7009}"/>
-              </a:ext>
-            </a:extLst>
-          </p:cNvPr>
-          <p:cNvPicPr>
-            <a:picLocks noGrp="1" noChangeAspect="1"/>
-          </p:cNvPicPr>
-          <p:nvPr>
-            <p:ph sz="half" idx="2"/>
-          </p:nvPr>
-        </p:nvPicPr>
-        <p:blipFill>
-          <a:blip r:embed="rId4"/>
-          <a:stretch>
-            <a:fillRect/>
-          </a:stretch>
-        </p:blipFill>
-        <p:spPr>
-          <a:xfrm>
-            <a:off x="4629150" y="1853407"/>
-            <a:ext cx="3886200" cy="1991486"/>
-          </a:xfrm>
-        </p:spPr>
-      </p:pic>
-      <p:sp>
-        <p:nvSpPr>
-          <p:cNvPr id="5" name="Slide Number Placeholder 4">
-            <a:extLst>
-              <a:ext uri="{FF2B5EF4-FFF2-40B4-BE49-F238E27FC236}">
-                <a16:creationId xmlns:a16="http://schemas.microsoft.com/office/drawing/2014/main" id="{DF59765E-8A4D-44A7-8F3B-A9FE57AA7728}"/>
-              </a:ext>
-            </a:extLst>
-          </p:cNvPr>
-          <p:cNvSpPr>
-            <a:spLocks noGrp="1"/>
-          </p:cNvSpPr>
-          <p:nvPr>
-            <p:ph type="sldNum" sz="quarter" idx="12"/>
-          </p:nvPr>
-        </p:nvSpPr>
-        <p:spPr/>
-        <p:txBody>
-          <a:bodyPr/>
-          <a:lstStyle/>
-          <a:p>
-            <a:fld id="{CAB166B3-F268-4CEF-878A-CFB0D0D505D3}" type="slidenum">
-              <a:rPr lang="en-US" smtClean="0"/>
-              <a:t>9</a:t>
-            </a:fld>
-            <a:endParaRPr lang="en-US"/>
-          </a:p>
-        </p:txBody>
-      </p:sp>
-    </p:spTree>
-    <p:extLst>
-      <p:ext uri="{BB962C8B-B14F-4D97-AF65-F5344CB8AC3E}">
-        <p14:creationId xmlns:p14="http://schemas.microsoft.com/office/powerpoint/2010/main" val="3146419609"/>
       </p:ext>
     </p:extLst>
   </p:cSld>

</xml_diff>